<commit_message>
IOT Hub picture update
</commit_message>
<xml_diff>
--- a/Documentation/GuideVisitBandBot_SmartOffice.pptx
+++ b/Documentation/GuideVisitBandBot_SmartOffice.pptx
@@ -2,10 +2,10 @@
 <file path=ppt/presentation.xml><?xml version="1.0" encoding="utf-8"?>
 <p:presentation xmlns:a="http://schemas.openxmlformats.org/drawingml/2006/main" xmlns:r="http://schemas.openxmlformats.org/officeDocument/2006/relationships" xmlns:p="http://schemas.openxmlformats.org/presentationml/2006/main" saveSubsetFonts="1">
   <p:sldMasterIdLst>
-    <p:sldMasterId id="2147483648" r:id="rId5"/>
+    <p:sldMasterId id="2147483648" r:id="rId9"/>
   </p:sldMasterIdLst>
   <p:sldIdLst>
-    <p:sldId id="256" r:id="rId6"/>
+    <p:sldId id="257" r:id="rId10"/>
   </p:sldIdLst>
   <p:sldSz cx="12192000" cy="6858000"/>
   <p:notesSz cx="6858000" cy="9144000"/>
@@ -104,6 +104,11 @@
       </a:defRPr>
     </a:lvl9pPr>
   </p:defaultTextStyle>
+  <p:extLst>
+    <p:ext uri="{EFAFB233-063F-42B5-8137-9DF3F51BA10A}">
+      <p15:sldGuideLst xmlns:p15="http://schemas.microsoft.com/office/powerpoint/2012/main"/>
+    </p:ext>
+  </p:extLst>
 </p:presentation>
 </file>
 
@@ -238,7 +243,7 @@
           <a:p>
             <a:fld id="{F81F548A-ADA4-4F61-B39E-5DDE81F69D9C}" type="datetimeFigureOut">
               <a:rPr lang="cs-CZ" smtClean="0"/>
-              <a:t>29.07.2016</a:t>
+              <a:t>30.07.2016</a:t>
             </a:fld>
             <a:endParaRPr lang="cs-CZ"/>
           </a:p>
@@ -408,7 +413,7 @@
           <a:p>
             <a:fld id="{F81F548A-ADA4-4F61-B39E-5DDE81F69D9C}" type="datetimeFigureOut">
               <a:rPr lang="cs-CZ" smtClean="0"/>
-              <a:t>29.07.2016</a:t>
+              <a:t>30.07.2016</a:t>
             </a:fld>
             <a:endParaRPr lang="cs-CZ"/>
           </a:p>
@@ -588,7 +593,7 @@
           <a:p>
             <a:fld id="{F81F548A-ADA4-4F61-B39E-5DDE81F69D9C}" type="datetimeFigureOut">
               <a:rPr lang="cs-CZ" smtClean="0"/>
-              <a:t>29.07.2016</a:t>
+              <a:t>30.07.2016</a:t>
             </a:fld>
             <a:endParaRPr lang="cs-CZ"/>
           </a:p>
@@ -758,7 +763,7 @@
           <a:p>
             <a:fld id="{F81F548A-ADA4-4F61-B39E-5DDE81F69D9C}" type="datetimeFigureOut">
               <a:rPr lang="cs-CZ" smtClean="0"/>
-              <a:t>29.07.2016</a:t>
+              <a:t>30.07.2016</a:t>
             </a:fld>
             <a:endParaRPr lang="cs-CZ"/>
           </a:p>
@@ -1004,7 +1009,7 @@
           <a:p>
             <a:fld id="{F81F548A-ADA4-4F61-B39E-5DDE81F69D9C}" type="datetimeFigureOut">
               <a:rPr lang="cs-CZ" smtClean="0"/>
-              <a:t>29.07.2016</a:t>
+              <a:t>30.07.2016</a:t>
             </a:fld>
             <a:endParaRPr lang="cs-CZ"/>
           </a:p>
@@ -1236,7 +1241,7 @@
           <a:p>
             <a:fld id="{F81F548A-ADA4-4F61-B39E-5DDE81F69D9C}" type="datetimeFigureOut">
               <a:rPr lang="cs-CZ" smtClean="0"/>
-              <a:t>29.07.2016</a:t>
+              <a:t>30.07.2016</a:t>
             </a:fld>
             <a:endParaRPr lang="cs-CZ"/>
           </a:p>
@@ -1603,7 +1608,7 @@
           <a:p>
             <a:fld id="{F81F548A-ADA4-4F61-B39E-5DDE81F69D9C}" type="datetimeFigureOut">
               <a:rPr lang="cs-CZ" smtClean="0"/>
-              <a:t>29.07.2016</a:t>
+              <a:t>30.07.2016</a:t>
             </a:fld>
             <a:endParaRPr lang="cs-CZ"/>
           </a:p>
@@ -1721,7 +1726,7 @@
           <a:p>
             <a:fld id="{F81F548A-ADA4-4F61-B39E-5DDE81F69D9C}" type="datetimeFigureOut">
               <a:rPr lang="cs-CZ" smtClean="0"/>
-              <a:t>29.07.2016</a:t>
+              <a:t>30.07.2016</a:t>
             </a:fld>
             <a:endParaRPr lang="cs-CZ"/>
           </a:p>
@@ -1816,7 +1821,7 @@
           <a:p>
             <a:fld id="{F81F548A-ADA4-4F61-B39E-5DDE81F69D9C}" type="datetimeFigureOut">
               <a:rPr lang="cs-CZ" smtClean="0"/>
-              <a:t>29.07.2016</a:t>
+              <a:t>30.07.2016</a:t>
             </a:fld>
             <a:endParaRPr lang="cs-CZ"/>
           </a:p>
@@ -2093,7 +2098,7 @@
           <a:p>
             <a:fld id="{F81F548A-ADA4-4F61-B39E-5DDE81F69D9C}" type="datetimeFigureOut">
               <a:rPr lang="cs-CZ" smtClean="0"/>
-              <a:t>29.07.2016</a:t>
+              <a:t>30.07.2016</a:t>
             </a:fld>
             <a:endParaRPr lang="cs-CZ"/>
           </a:p>
@@ -2346,7 +2351,7 @@
           <a:p>
             <a:fld id="{F81F548A-ADA4-4F61-B39E-5DDE81F69D9C}" type="datetimeFigureOut">
               <a:rPr lang="cs-CZ" smtClean="0"/>
-              <a:t>29.07.2016</a:t>
+              <a:t>30.07.2016</a:t>
             </a:fld>
             <a:endParaRPr lang="cs-CZ"/>
           </a:p>
@@ -2559,7 +2564,7 @@
           <a:p>
             <a:fld id="{F81F548A-ADA4-4F61-B39E-5DDE81F69D9C}" type="datetimeFigureOut">
               <a:rPr lang="cs-CZ" smtClean="0"/>
-              <a:t>29.07.2016</a:t>
+              <a:t>30.07.2016</a:t>
             </a:fld>
             <a:endParaRPr lang="cs-CZ"/>
           </a:p>
@@ -2964,1389 +2969,1446 @@
           <a:chExt cx="0" cy="0"/>
         </a:xfrm>
       </p:grpSpPr>
-      <p:pic>
-        <p:nvPicPr>
-          <p:cNvPr id="9" name="Picture 8"/>
-          <p:cNvPicPr>
-            <a:picLocks noChangeAspect="1"/>
-          </p:cNvPicPr>
+      <p:grpSp>
+        <p:nvGrpSpPr>
+          <p:cNvPr id="3" name="Group 2"/>
+          <p:cNvGrpSpPr/>
           <p:nvPr/>
-        </p:nvPicPr>
-        <p:blipFill>
-          <a:blip r:embed="rId6">
-            <a:extLst>
-              <a:ext uri="{28A0092B-C50C-407E-A947-70E740481C1C}">
-                <a14:useLocalDpi xmlns:a14="http://schemas.microsoft.com/office/drawing/2010/main" val="0"/>
-              </a:ext>
-            </a:extLst>
-          </a:blip>
-          <a:stretch>
-            <a:fillRect/>
-          </a:stretch>
-        </p:blipFill>
-        <p:spPr>
+        </p:nvGrpSpPr>
+        <p:grpSpPr>
           <a:xfrm>
-            <a:off x="409797" y="1517325"/>
-            <a:ext cx="942646" cy="530675"/>
+            <a:off x="409797" y="475113"/>
+            <a:ext cx="11404130" cy="6181975"/>
+            <a:chOff x="409797" y="475113"/>
+            <a:chExt cx="11404130" cy="6181975"/>
           </a:xfrm>
-          <a:prstGeom prst="rect">
-            <a:avLst/>
-          </a:prstGeom>
-        </p:spPr>
-      </p:pic>
-      <p:pic>
-        <p:nvPicPr>
-          <p:cNvPr id="11" name="Picture 10"/>
-          <p:cNvPicPr>
-            <a:picLocks noChangeAspect="1"/>
-          </p:cNvPicPr>
-          <p:nvPr/>
-        </p:nvPicPr>
-        <p:blipFill>
-          <a:blip r:embed="rId6">
-            <a:extLst>
-              <a:ext uri="{28A0092B-C50C-407E-A947-70E740481C1C}">
-                <a14:useLocalDpi xmlns:a14="http://schemas.microsoft.com/office/drawing/2010/main" val="0"/>
-              </a:ext>
-            </a:extLst>
-          </a:blip>
-          <a:stretch>
-            <a:fillRect/>
-          </a:stretch>
-        </p:blipFill>
-        <p:spPr>
-          <a:xfrm>
-            <a:off x="1334613" y="1239557"/>
-            <a:ext cx="942646" cy="530675"/>
-          </a:xfrm>
-          <a:prstGeom prst="rect">
-            <a:avLst/>
-          </a:prstGeom>
-        </p:spPr>
-      </p:pic>
-      <p:pic>
-        <p:nvPicPr>
-          <p:cNvPr id="12" name="Picture 2" descr="C:\Users\t-dantay\Documents\Placeholders\user.png"/>
-          <p:cNvPicPr>
-            <a:picLocks noChangeAspect="1" noChangeArrowheads="1"/>
-          </p:cNvPicPr>
-          <p:nvPr>
-            <p:custDataLst>
-              <p:custData r:id="rId1"/>
-            </p:custDataLst>
-          </p:nvPr>
-        </p:nvPicPr>
-        <p:blipFill>
-          <a:blip r:embed="rId7" cstate="print">
-            <a:extLst>
-              <a:ext uri="{28A0092B-C50C-407E-A947-70E740481C1C}">
-                <a14:useLocalDpi xmlns:a14="http://schemas.microsoft.com/office/drawing/2010/main" val="0"/>
-              </a:ext>
-            </a:extLst>
-          </a:blip>
-          <a:srcRect/>
-          <a:stretch>
-            <a:fillRect/>
-          </a:stretch>
-        </p:blipFill>
-        <p:spPr bwMode="auto">
-          <a:xfrm>
-            <a:off x="1060925" y="737946"/>
-            <a:ext cx="410924" cy="518615"/>
-          </a:xfrm>
-          <a:prstGeom prst="rect">
-            <a:avLst/>
-          </a:prstGeom>
-          <a:noFill/>
-          <a:extLst>
-            <a:ext uri="{909E8E84-426E-40DD-AFC4-6F175D3DCCD1}">
-              <a14:hiddenFill xmlns:a14="http://schemas.microsoft.com/office/drawing/2010/main">
-                <a:solidFill>
-                  <a:srgbClr val="FFFFFF"/>
-                </a:solidFill>
-              </a14:hiddenFill>
-            </a:ext>
-          </a:extLst>
-        </p:spPr>
-      </p:pic>
-      <p:pic>
-        <p:nvPicPr>
-          <p:cNvPr id="13" name="Picture 2" descr="C:\Users\t-dantay\Documents\Placeholders\user.png"/>
-          <p:cNvPicPr>
-            <a:picLocks noChangeAspect="1" noChangeArrowheads="1"/>
-          </p:cNvPicPr>
-          <p:nvPr>
-            <p:custDataLst>
-              <p:custData r:id="rId2"/>
-            </p:custDataLst>
-          </p:nvPr>
-        </p:nvPicPr>
-        <p:blipFill>
-          <a:blip r:embed="rId7" cstate="print">
-            <a:extLst>
-              <a:ext uri="{28A0092B-C50C-407E-A947-70E740481C1C}">
-                <a14:useLocalDpi xmlns:a14="http://schemas.microsoft.com/office/drawing/2010/main" val="0"/>
-              </a:ext>
-            </a:extLst>
-          </a:blip>
-          <a:srcRect/>
-          <a:stretch>
-            <a:fillRect/>
-          </a:stretch>
-        </p:blipFill>
-        <p:spPr bwMode="auto">
-          <a:xfrm>
-            <a:off x="589235" y="905576"/>
-            <a:ext cx="410002" cy="517451"/>
-          </a:xfrm>
-          <a:prstGeom prst="rect">
-            <a:avLst/>
-          </a:prstGeom>
-          <a:noFill/>
-          <a:extLst>
-            <a:ext uri="{909E8E84-426E-40DD-AFC4-6F175D3DCCD1}">
-              <a14:hiddenFill xmlns:a14="http://schemas.microsoft.com/office/drawing/2010/main">
-                <a:solidFill>
-                  <a:srgbClr val="FFFFFF"/>
-                </a:solidFill>
-              </a14:hiddenFill>
-            </a:ext>
-          </a:extLst>
-        </p:spPr>
-      </p:pic>
-      <p:sp>
-        <p:nvSpPr>
-          <p:cNvPr id="16" name="TextBox 15"/>
-          <p:cNvSpPr txBox="1"/>
-          <p:nvPr/>
-        </p:nvSpPr>
-        <p:spPr>
-          <a:xfrm>
-            <a:off x="607460" y="2030811"/>
-            <a:ext cx="1573636" cy="1015663"/>
-          </a:xfrm>
-          <a:prstGeom prst="rect">
-            <a:avLst/>
-          </a:prstGeom>
-          <a:noFill/>
-        </p:spPr>
-        <p:txBody>
-          <a:bodyPr wrap="none" rtlCol="0">
-            <a:spAutoFit/>
-          </a:bodyPr>
-          <a:lstStyle/>
-          <a:p>
-            <a:pPr algn="ctr"/>
-            <a:r>
-              <a:rPr lang="en-US" sz="2000" b="1" dirty="0">
-                <a:solidFill>
-                  <a:srgbClr val="7030A0"/>
-                </a:solidFill>
-              </a:rPr>
-              <a:t>Visitors with </a:t>
-            </a:r>
-            <a:br>
-              <a:rPr lang="en-US" sz="2000" b="1" dirty="0">
-                <a:solidFill>
-                  <a:srgbClr val="7030A0"/>
-                </a:solidFill>
-              </a:rPr>
-            </a:br>
-            <a:r>
-              <a:rPr lang="en-US" sz="2000" b="1" dirty="0">
-                <a:solidFill>
-                  <a:srgbClr val="7030A0"/>
-                </a:solidFill>
-              </a:rPr>
-              <a:t>borrowed</a:t>
-            </a:r>
-          </a:p>
-          <a:p>
-            <a:pPr algn="ctr"/>
-            <a:r>
-              <a:rPr lang="en-US" sz="2000" b="1" dirty="0">
-                <a:solidFill>
-                  <a:srgbClr val="7030A0"/>
-                </a:solidFill>
-              </a:rPr>
-              <a:t>MS Band</a:t>
-            </a:r>
-          </a:p>
-        </p:txBody>
-      </p:sp>
-      <p:cxnSp>
-        <p:nvCxnSpPr>
-          <p:cNvPr id="18" name="Straight Arrow Connector 17"/>
-          <p:cNvCxnSpPr/>
-          <p:nvPr/>
-        </p:nvCxnSpPr>
-        <p:spPr>
-          <a:xfrm>
-            <a:off x="2367764" y="2626532"/>
-            <a:ext cx="2073306" cy="0"/>
-          </a:xfrm>
-          <a:prstGeom prst="straightConnector1">
-            <a:avLst/>
-          </a:prstGeom>
-          <a:ln w="38100">
-            <a:headEnd type="triangle"/>
-            <a:tailEnd type="triangle"/>
-          </a:ln>
-        </p:spPr>
-        <p:style>
-          <a:lnRef idx="1">
-            <a:schemeClr val="accent1"/>
-          </a:lnRef>
-          <a:fillRef idx="0">
-            <a:schemeClr val="accent1"/>
-          </a:fillRef>
-          <a:effectRef idx="0">
-            <a:schemeClr val="accent1"/>
-          </a:effectRef>
-          <a:fontRef idx="minor">
-            <a:schemeClr val="tx1"/>
-          </a:fontRef>
-        </p:style>
-      </p:cxnSp>
-      <p:sp>
-        <p:nvSpPr>
-          <p:cNvPr id="19" name="TextBox 18"/>
-          <p:cNvSpPr txBox="1"/>
-          <p:nvPr/>
-        </p:nvSpPr>
-        <p:spPr>
-          <a:xfrm>
-            <a:off x="4220124" y="567938"/>
-            <a:ext cx="1903981" cy="1323439"/>
-          </a:xfrm>
-          <a:prstGeom prst="rect">
-            <a:avLst/>
-          </a:prstGeom>
-          <a:noFill/>
-        </p:spPr>
-        <p:txBody>
-          <a:bodyPr wrap="square" rtlCol="0">
-            <a:spAutoFit/>
-          </a:bodyPr>
-          <a:lstStyle/>
-          <a:p>
-            <a:r>
-              <a:rPr lang="en-US" sz="2000" b="1" dirty="0">
-                <a:solidFill>
-                  <a:srgbClr val="7030A0"/>
-                </a:solidFill>
-              </a:rPr>
-              <a:t>Event owner or visitor guide with mobile phone app.</a:t>
-            </a:r>
-          </a:p>
-        </p:txBody>
-      </p:sp>
-      <p:pic>
-        <p:nvPicPr>
-          <p:cNvPr id="20" name="Picture 2" descr="C:\Users\t-dantay\Documents\Placeholders\user.png"/>
-          <p:cNvPicPr>
-            <a:picLocks noChangeAspect="1" noChangeArrowheads="1"/>
-          </p:cNvPicPr>
-          <p:nvPr>
-            <p:custDataLst>
-              <p:custData r:id="rId3"/>
-            </p:custDataLst>
-          </p:nvPr>
-        </p:nvPicPr>
-        <p:blipFill>
-          <a:blip r:embed="rId7" cstate="print">
-            <a:extLst>
-              <a:ext uri="{28A0092B-C50C-407E-A947-70E740481C1C}">
-                <a14:useLocalDpi xmlns:a14="http://schemas.microsoft.com/office/drawing/2010/main" val="0"/>
-              </a:ext>
-            </a:extLst>
-          </a:blip>
-          <a:srcRect/>
-          <a:stretch>
-            <a:fillRect/>
-          </a:stretch>
-        </p:blipFill>
-        <p:spPr bwMode="auto">
-          <a:xfrm>
-            <a:off x="4801320" y="1875255"/>
-            <a:ext cx="402800" cy="508362"/>
-          </a:xfrm>
-          <a:prstGeom prst="rect">
-            <a:avLst/>
-          </a:prstGeom>
-          <a:noFill/>
-          <a:extLst>
-            <a:ext uri="{909E8E84-426E-40DD-AFC4-6F175D3DCCD1}">
-              <a14:hiddenFill xmlns:a14="http://schemas.microsoft.com/office/drawing/2010/main">
-                <a:solidFill>
-                  <a:srgbClr val="FFFFFF"/>
-                </a:solidFill>
-              </a14:hiddenFill>
-            </a:ext>
-          </a:extLst>
-        </p:spPr>
-      </p:pic>
-      <p:sp>
-        <p:nvSpPr>
-          <p:cNvPr id="22" name="TextBox 21"/>
-          <p:cNvSpPr txBox="1"/>
-          <p:nvPr/>
-        </p:nvSpPr>
-        <p:spPr>
-          <a:xfrm>
-            <a:off x="2846539" y="2157411"/>
-            <a:ext cx="1115755" cy="369332"/>
-          </a:xfrm>
-          <a:prstGeom prst="rect">
-            <a:avLst/>
-          </a:prstGeom>
-          <a:noFill/>
-        </p:spPr>
-        <p:txBody>
-          <a:bodyPr wrap="none" rtlCol="0">
-            <a:spAutoFit/>
-          </a:bodyPr>
-          <a:lstStyle/>
-          <a:p>
-            <a:r>
-              <a:rPr lang="en-US" dirty="0"/>
-              <a:t>Bluetooth</a:t>
-            </a:r>
-          </a:p>
-        </p:txBody>
-      </p:sp>
-      <p:pic>
-        <p:nvPicPr>
-          <p:cNvPr id="23" name="Picture 22"/>
-          <p:cNvPicPr>
-            <a:picLocks noChangeAspect="1"/>
-          </p:cNvPicPr>
-          <p:nvPr/>
-        </p:nvPicPr>
-        <p:blipFill>
-          <a:blip r:embed="rId8"/>
-          <a:stretch>
-            <a:fillRect/>
-          </a:stretch>
-        </p:blipFill>
-        <p:spPr>
-          <a:xfrm>
-            <a:off x="5686280" y="1151675"/>
-            <a:ext cx="785666" cy="1284079"/>
-          </a:xfrm>
-          <a:prstGeom prst="rect">
-            <a:avLst/>
-          </a:prstGeom>
-        </p:spPr>
-      </p:pic>
-      <p:sp>
-        <p:nvSpPr>
-          <p:cNvPr id="27" name="TextBox 26"/>
-          <p:cNvSpPr txBox="1"/>
-          <p:nvPr/>
-        </p:nvSpPr>
-        <p:spPr>
-          <a:xfrm>
-            <a:off x="9596175" y="2664751"/>
-            <a:ext cx="2028266" cy="400110"/>
-          </a:xfrm>
-          <a:prstGeom prst="rect">
-            <a:avLst/>
-          </a:prstGeom>
-          <a:noFill/>
-        </p:spPr>
-        <p:txBody>
-          <a:bodyPr wrap="square" rtlCol="0">
-            <a:spAutoFit/>
-          </a:bodyPr>
-          <a:lstStyle/>
-          <a:p>
-            <a:r>
-              <a:rPr lang="en-US" sz="2000" b="1" dirty="0">
-                <a:solidFill>
-                  <a:srgbClr val="7030A0"/>
-                </a:solidFill>
-              </a:rPr>
-              <a:t>Azure Event Hub</a:t>
-            </a:r>
-          </a:p>
-        </p:txBody>
-      </p:sp>
-      <p:pic>
-        <p:nvPicPr>
-          <p:cNvPr id="26" name="Picture 25"/>
-          <p:cNvPicPr>
-            <a:picLocks noChangeAspect="1"/>
-          </p:cNvPicPr>
-          <p:nvPr/>
-        </p:nvPicPr>
-        <p:blipFill>
-          <a:blip r:embed="rId9">
-            <a:extLst>
-              <a:ext uri="{28A0092B-C50C-407E-A947-70E740481C1C}">
-                <a14:useLocalDpi xmlns:a14="http://schemas.microsoft.com/office/drawing/2010/main" val="0"/>
-              </a:ext>
-            </a:extLst>
-          </a:blip>
-          <a:stretch>
-            <a:fillRect/>
-          </a:stretch>
-        </p:blipFill>
-        <p:spPr>
-          <a:xfrm>
-            <a:off x="10006204" y="1277887"/>
-            <a:ext cx="1208207" cy="1208207"/>
-          </a:xfrm>
-          <a:prstGeom prst="rect">
-            <a:avLst/>
-          </a:prstGeom>
-        </p:spPr>
-      </p:pic>
-      <p:pic>
-        <p:nvPicPr>
-          <p:cNvPr id="28" name="Picture 27"/>
-          <p:cNvPicPr>
-            <a:picLocks noChangeAspect="1"/>
-          </p:cNvPicPr>
-          <p:nvPr/>
-        </p:nvPicPr>
-        <p:blipFill>
-          <a:blip r:embed="rId10">
-            <a:extLst>
-              <a:ext uri="{28A0092B-C50C-407E-A947-70E740481C1C}">
-                <a14:useLocalDpi xmlns:a14="http://schemas.microsoft.com/office/drawing/2010/main" val="0"/>
-              </a:ext>
-            </a:extLst>
-          </a:blip>
-          <a:stretch>
-            <a:fillRect/>
-          </a:stretch>
-        </p:blipFill>
-        <p:spPr>
-          <a:xfrm>
-            <a:off x="8621786" y="829056"/>
-            <a:ext cx="917313" cy="722140"/>
-          </a:xfrm>
-          <a:prstGeom prst="rect">
-            <a:avLst/>
-          </a:prstGeom>
-        </p:spPr>
-      </p:pic>
-      <p:sp>
-        <p:nvSpPr>
-          <p:cNvPr id="30" name="TextBox 29"/>
-          <p:cNvSpPr txBox="1"/>
-          <p:nvPr/>
-        </p:nvSpPr>
-        <p:spPr>
-          <a:xfrm>
-            <a:off x="7258513" y="475113"/>
-            <a:ext cx="2185340" cy="707886"/>
-          </a:xfrm>
-          <a:prstGeom prst="rect">
-            <a:avLst/>
-          </a:prstGeom>
-          <a:noFill/>
-        </p:spPr>
-        <p:txBody>
-          <a:bodyPr wrap="square" rtlCol="0">
-            <a:spAutoFit/>
-          </a:bodyPr>
-          <a:lstStyle/>
-          <a:p>
-            <a:r>
-              <a:rPr lang="en-US" sz="2000" b="1" dirty="0">
+        </p:grpSpPr>
+        <p:grpSp>
+          <p:nvGrpSpPr>
+            <p:cNvPr id="2" name="Group 1"/>
+            <p:cNvGrpSpPr/>
+            <p:nvPr/>
+          </p:nvGrpSpPr>
+          <p:grpSpPr>
+            <a:xfrm>
+              <a:off x="409797" y="475113"/>
+              <a:ext cx="11404130" cy="6181975"/>
+              <a:chOff x="409797" y="475113"/>
+              <a:chExt cx="11404130" cy="6181975"/>
+            </a:xfrm>
+          </p:grpSpPr>
+          <p:pic>
+            <p:nvPicPr>
+              <p:cNvPr id="9" name="Picture 8"/>
+              <p:cNvPicPr>
+                <a:picLocks noChangeAspect="1"/>
+              </p:cNvPicPr>
+              <p:nvPr/>
+            </p:nvPicPr>
+            <p:blipFill>
+              <a:blip r:embed="rId6">
+                <a:extLst>
+                  <a:ext uri="{28A0092B-C50C-407E-A947-70E740481C1C}">
+                    <a14:useLocalDpi xmlns:a14="http://schemas.microsoft.com/office/drawing/2010/main" val="0"/>
+                  </a:ext>
+                </a:extLst>
+              </a:blip>
+              <a:stretch>
+                <a:fillRect/>
+              </a:stretch>
+            </p:blipFill>
+            <p:spPr>
+              <a:xfrm>
+                <a:off x="409797" y="1517325"/>
+                <a:ext cx="942646" cy="530675"/>
+              </a:xfrm>
+              <a:prstGeom prst="rect">
+                <a:avLst/>
+              </a:prstGeom>
+            </p:spPr>
+          </p:pic>
+          <p:pic>
+            <p:nvPicPr>
+              <p:cNvPr id="11" name="Picture 10"/>
+              <p:cNvPicPr>
+                <a:picLocks noChangeAspect="1"/>
+              </p:cNvPicPr>
+              <p:nvPr/>
+            </p:nvPicPr>
+            <p:blipFill>
+              <a:blip r:embed="rId6">
+                <a:extLst>
+                  <a:ext uri="{28A0092B-C50C-407E-A947-70E740481C1C}">
+                    <a14:useLocalDpi xmlns:a14="http://schemas.microsoft.com/office/drawing/2010/main" val="0"/>
+                  </a:ext>
+                </a:extLst>
+              </a:blip>
+              <a:stretch>
+                <a:fillRect/>
+              </a:stretch>
+            </p:blipFill>
+            <p:spPr>
+              <a:xfrm>
+                <a:off x="1334613" y="1239557"/>
+                <a:ext cx="942646" cy="530675"/>
+              </a:xfrm>
+              <a:prstGeom prst="rect">
+                <a:avLst/>
+              </a:prstGeom>
+            </p:spPr>
+          </p:pic>
+          <p:pic>
+            <p:nvPicPr>
+              <p:cNvPr id="12" name="Picture 2" descr="C:\Users\t-dantay\Documents\Placeholders\user.png"/>
+              <p:cNvPicPr>
+                <a:picLocks noChangeAspect="1" noChangeArrowheads="1"/>
+              </p:cNvPicPr>
+              <p:nvPr>
+                <p:custDataLst>
+                  <p:custData r:id="rId1"/>
+                </p:custDataLst>
+              </p:nvPr>
+            </p:nvPicPr>
+            <p:blipFill>
+              <a:blip r:embed="rId7" cstate="print">
+                <a:extLst>
+                  <a:ext uri="{28A0092B-C50C-407E-A947-70E740481C1C}">
+                    <a14:useLocalDpi xmlns:a14="http://schemas.microsoft.com/office/drawing/2010/main" val="0"/>
+                  </a:ext>
+                </a:extLst>
+              </a:blip>
+              <a:srcRect/>
+              <a:stretch>
+                <a:fillRect/>
+              </a:stretch>
+            </p:blipFill>
+            <p:spPr bwMode="auto">
+              <a:xfrm>
+                <a:off x="1060925" y="737946"/>
+                <a:ext cx="410924" cy="518615"/>
+              </a:xfrm>
+              <a:prstGeom prst="rect">
+                <a:avLst/>
+              </a:prstGeom>
+              <a:noFill/>
+              <a:extLst>
+                <a:ext uri="{909E8E84-426E-40DD-AFC4-6F175D3DCCD1}">
+                  <a14:hiddenFill xmlns:a14="http://schemas.microsoft.com/office/drawing/2010/main">
+                    <a:solidFill>
+                      <a:srgbClr val="FFFFFF"/>
+                    </a:solidFill>
+                  </a14:hiddenFill>
+                </a:ext>
+              </a:extLst>
+            </p:spPr>
+          </p:pic>
+          <p:pic>
+            <p:nvPicPr>
+              <p:cNvPr id="13" name="Picture 2" descr="C:\Users\t-dantay\Documents\Placeholders\user.png"/>
+              <p:cNvPicPr>
+                <a:picLocks noChangeAspect="1" noChangeArrowheads="1"/>
+              </p:cNvPicPr>
+              <p:nvPr>
+                <p:custDataLst>
+                  <p:custData r:id="rId2"/>
+                </p:custDataLst>
+              </p:nvPr>
+            </p:nvPicPr>
+            <p:blipFill>
+              <a:blip r:embed="rId7" cstate="print">
+                <a:extLst>
+                  <a:ext uri="{28A0092B-C50C-407E-A947-70E740481C1C}">
+                    <a14:useLocalDpi xmlns:a14="http://schemas.microsoft.com/office/drawing/2010/main" val="0"/>
+                  </a:ext>
+                </a:extLst>
+              </a:blip>
+              <a:srcRect/>
+              <a:stretch>
+                <a:fillRect/>
+              </a:stretch>
+            </p:blipFill>
+            <p:spPr bwMode="auto">
+              <a:xfrm>
+                <a:off x="589235" y="905576"/>
+                <a:ext cx="410002" cy="517451"/>
+              </a:xfrm>
+              <a:prstGeom prst="rect">
+                <a:avLst/>
+              </a:prstGeom>
+              <a:noFill/>
+              <a:extLst>
+                <a:ext uri="{909E8E84-426E-40DD-AFC4-6F175D3DCCD1}">
+                  <a14:hiddenFill xmlns:a14="http://schemas.microsoft.com/office/drawing/2010/main">
+                    <a:solidFill>
+                      <a:srgbClr val="FFFFFF"/>
+                    </a:solidFill>
+                  </a14:hiddenFill>
+                </a:ext>
+              </a:extLst>
+            </p:spPr>
+          </p:pic>
+          <p:sp>
+            <p:nvSpPr>
+              <p:cNvPr id="16" name="TextBox 15"/>
+              <p:cNvSpPr txBox="1"/>
+              <p:nvPr/>
+            </p:nvSpPr>
+            <p:spPr>
+              <a:xfrm>
+                <a:off x="607460" y="2030811"/>
+                <a:ext cx="1573636" cy="1015663"/>
+              </a:xfrm>
+              <a:prstGeom prst="rect">
+                <a:avLst/>
+              </a:prstGeom>
+              <a:noFill/>
+            </p:spPr>
+            <p:txBody>
+              <a:bodyPr wrap="none" rtlCol="0">
+                <a:spAutoFit/>
+              </a:bodyPr>
+              <a:lstStyle/>
+              <a:p>
+                <a:pPr algn="ctr"/>
+                <a:r>
+                  <a:rPr lang="en-US" sz="2000" b="1" dirty="0">
+                    <a:solidFill>
+                      <a:srgbClr val="7030A0"/>
+                    </a:solidFill>
+                  </a:rPr>
+                  <a:t>Visitors with </a:t>
+                </a:r>
+                <a:br>
+                  <a:rPr lang="en-US" sz="2000" b="1" dirty="0">
+                    <a:solidFill>
+                      <a:srgbClr val="7030A0"/>
+                    </a:solidFill>
+                  </a:rPr>
+                </a:br>
+                <a:r>
+                  <a:rPr lang="en-US" sz="2000" b="1" dirty="0">
+                    <a:solidFill>
+                      <a:srgbClr val="7030A0"/>
+                    </a:solidFill>
+                  </a:rPr>
+                  <a:t>borrowed</a:t>
+                </a:r>
+              </a:p>
+              <a:p>
+                <a:pPr algn="ctr"/>
+                <a:r>
+                  <a:rPr lang="en-US" sz="2000" b="1" dirty="0">
+                    <a:solidFill>
+                      <a:srgbClr val="7030A0"/>
+                    </a:solidFill>
+                  </a:rPr>
+                  <a:t>MS Band</a:t>
+                </a:r>
+              </a:p>
+            </p:txBody>
+          </p:sp>
+          <p:cxnSp>
+            <p:nvCxnSpPr>
+              <p:cNvPr id="18" name="Straight Arrow Connector 17"/>
+              <p:cNvCxnSpPr/>
+              <p:nvPr/>
+            </p:nvCxnSpPr>
+            <p:spPr>
+              <a:xfrm>
+                <a:off x="2367764" y="2626532"/>
+                <a:ext cx="2073306" cy="0"/>
+              </a:xfrm>
+              <a:prstGeom prst="straightConnector1">
+                <a:avLst/>
+              </a:prstGeom>
+              <a:ln w="38100">
+                <a:headEnd type="triangle"/>
+                <a:tailEnd type="triangle"/>
+              </a:ln>
+            </p:spPr>
+            <p:style>
+              <a:lnRef idx="1">
+                <a:schemeClr val="accent1"/>
+              </a:lnRef>
+              <a:fillRef idx="0">
+                <a:schemeClr val="accent1"/>
+              </a:fillRef>
+              <a:effectRef idx="0">
+                <a:schemeClr val="accent1"/>
+              </a:effectRef>
+              <a:fontRef idx="minor">
+                <a:schemeClr val="tx1"/>
+              </a:fontRef>
+            </p:style>
+          </p:cxnSp>
+          <p:sp>
+            <p:nvSpPr>
+              <p:cNvPr id="19" name="TextBox 18"/>
+              <p:cNvSpPr txBox="1"/>
+              <p:nvPr/>
+            </p:nvSpPr>
+            <p:spPr>
+              <a:xfrm>
+                <a:off x="4220124" y="567938"/>
+                <a:ext cx="1903981" cy="1323439"/>
+              </a:xfrm>
+              <a:prstGeom prst="rect">
+                <a:avLst/>
+              </a:prstGeom>
+              <a:noFill/>
+            </p:spPr>
+            <p:txBody>
+              <a:bodyPr wrap="square" rtlCol="0">
+                <a:spAutoFit/>
+              </a:bodyPr>
+              <a:lstStyle/>
+              <a:p>
+                <a:r>
+                  <a:rPr lang="en-US" sz="2000" b="1" dirty="0">
+                    <a:solidFill>
+                      <a:srgbClr val="7030A0"/>
+                    </a:solidFill>
+                  </a:rPr>
+                  <a:t>Event owner or visitor guide with mobile phone app.</a:t>
+                </a:r>
+              </a:p>
+            </p:txBody>
+          </p:sp>
+          <p:pic>
+            <p:nvPicPr>
+              <p:cNvPr id="20" name="Picture 2" descr="C:\Users\t-dantay\Documents\Placeholders\user.png"/>
+              <p:cNvPicPr>
+                <a:picLocks noChangeAspect="1" noChangeArrowheads="1"/>
+              </p:cNvPicPr>
+              <p:nvPr>
+                <p:custDataLst>
+                  <p:custData r:id="rId3"/>
+                </p:custDataLst>
+              </p:nvPr>
+            </p:nvPicPr>
+            <p:blipFill>
+              <a:blip r:embed="rId7" cstate="print">
+                <a:extLst>
+                  <a:ext uri="{28A0092B-C50C-407E-A947-70E740481C1C}">
+                    <a14:useLocalDpi xmlns:a14="http://schemas.microsoft.com/office/drawing/2010/main" val="0"/>
+                  </a:ext>
+                </a:extLst>
+              </a:blip>
+              <a:srcRect/>
+              <a:stretch>
+                <a:fillRect/>
+              </a:stretch>
+            </p:blipFill>
+            <p:spPr bwMode="auto">
+              <a:xfrm>
+                <a:off x="4801320" y="1875255"/>
+                <a:ext cx="402800" cy="508362"/>
+              </a:xfrm>
+              <a:prstGeom prst="rect">
+                <a:avLst/>
+              </a:prstGeom>
+              <a:noFill/>
+              <a:extLst>
+                <a:ext uri="{909E8E84-426E-40DD-AFC4-6F175D3DCCD1}">
+                  <a14:hiddenFill xmlns:a14="http://schemas.microsoft.com/office/drawing/2010/main">
+                    <a:solidFill>
+                      <a:srgbClr val="FFFFFF"/>
+                    </a:solidFill>
+                  </a14:hiddenFill>
+                </a:ext>
+              </a:extLst>
+            </p:spPr>
+          </p:pic>
+          <p:sp>
+            <p:nvSpPr>
+              <p:cNvPr id="22" name="TextBox 21"/>
+              <p:cNvSpPr txBox="1"/>
+              <p:nvPr/>
+            </p:nvSpPr>
+            <p:spPr>
+              <a:xfrm>
+                <a:off x="2846539" y="2157411"/>
+                <a:ext cx="1115755" cy="369332"/>
+              </a:xfrm>
+              <a:prstGeom prst="rect">
+                <a:avLst/>
+              </a:prstGeom>
+              <a:noFill/>
+            </p:spPr>
+            <p:txBody>
+              <a:bodyPr wrap="none" rtlCol="0">
+                <a:spAutoFit/>
+              </a:bodyPr>
+              <a:lstStyle/>
+              <a:p>
+                <a:r>
+                  <a:rPr lang="en-US" dirty="0"/>
+                  <a:t>Bluetooth</a:t>
+                </a:r>
+              </a:p>
+            </p:txBody>
+          </p:sp>
+          <p:pic>
+            <p:nvPicPr>
+              <p:cNvPr id="23" name="Picture 22"/>
+              <p:cNvPicPr>
+                <a:picLocks noChangeAspect="1"/>
+              </p:cNvPicPr>
+              <p:nvPr/>
+            </p:nvPicPr>
+            <p:blipFill>
+              <a:blip r:embed="rId8"/>
+              <a:stretch>
+                <a:fillRect/>
+              </a:stretch>
+            </p:blipFill>
+            <p:spPr>
+              <a:xfrm>
+                <a:off x="5686280" y="1151675"/>
+                <a:ext cx="785666" cy="1284079"/>
+              </a:xfrm>
+              <a:prstGeom prst="rect">
+                <a:avLst/>
+              </a:prstGeom>
+            </p:spPr>
+          </p:pic>
+          <p:sp>
+            <p:nvSpPr>
+              <p:cNvPr id="27" name="TextBox 26"/>
+              <p:cNvSpPr txBox="1"/>
+              <p:nvPr/>
+            </p:nvSpPr>
+            <p:spPr>
+              <a:xfrm>
+                <a:off x="9785661" y="2635915"/>
+                <a:ext cx="2028266" cy="400110"/>
+              </a:xfrm>
+              <a:prstGeom prst="rect">
+                <a:avLst/>
+              </a:prstGeom>
+              <a:noFill/>
+            </p:spPr>
+            <p:txBody>
+              <a:bodyPr wrap="square" rtlCol="0">
+                <a:spAutoFit/>
+              </a:bodyPr>
+              <a:lstStyle/>
+              <a:p>
+                <a:r>
+                  <a:rPr lang="en-US" sz="2000" b="1" dirty="0">
+                    <a:solidFill>
+                      <a:srgbClr val="7030A0"/>
+                    </a:solidFill>
+                  </a:rPr>
+                  <a:t>Azure </a:t>
+                </a:r>
+                <a:r>
+                  <a:rPr lang="cs-CZ" sz="2000" b="1" dirty="0">
+                    <a:solidFill>
+                      <a:srgbClr val="7030A0"/>
+                    </a:solidFill>
+                  </a:rPr>
+                  <a:t>IOT</a:t>
+                </a:r>
+                <a:r>
+                  <a:rPr lang="en-US" sz="2000" b="1" dirty="0">
+                    <a:solidFill>
+                      <a:srgbClr val="7030A0"/>
+                    </a:solidFill>
+                  </a:rPr>
+                  <a:t> Hub</a:t>
+                </a:r>
+              </a:p>
+            </p:txBody>
+          </p:sp>
+          <p:pic>
+            <p:nvPicPr>
+              <p:cNvPr id="28" name="Picture 27"/>
+              <p:cNvPicPr>
+                <a:picLocks noChangeAspect="1"/>
+              </p:cNvPicPr>
+              <p:nvPr/>
+            </p:nvPicPr>
+            <p:blipFill>
+              <a:blip r:embed="rId9">
+                <a:extLst>
+                  <a:ext uri="{28A0092B-C50C-407E-A947-70E740481C1C}">
+                    <a14:useLocalDpi xmlns:a14="http://schemas.microsoft.com/office/drawing/2010/main" val="0"/>
+                  </a:ext>
+                </a:extLst>
+              </a:blip>
+              <a:stretch>
+                <a:fillRect/>
+              </a:stretch>
+            </p:blipFill>
+            <p:spPr>
+              <a:xfrm>
+                <a:off x="8621786" y="829056"/>
+                <a:ext cx="917313" cy="722140"/>
+              </a:xfrm>
+              <a:prstGeom prst="rect">
+                <a:avLst/>
+              </a:prstGeom>
+            </p:spPr>
+          </p:pic>
+          <p:sp>
+            <p:nvSpPr>
+              <p:cNvPr id="30" name="TextBox 29"/>
+              <p:cNvSpPr txBox="1"/>
+              <p:nvPr/>
+            </p:nvSpPr>
+            <p:spPr>
+              <a:xfrm>
+                <a:off x="7258513" y="475113"/>
+                <a:ext cx="2185340" cy="707886"/>
+              </a:xfrm>
+              <a:prstGeom prst="rect">
+                <a:avLst/>
+              </a:prstGeom>
+              <a:noFill/>
+            </p:spPr>
+            <p:txBody>
+              <a:bodyPr wrap="square" rtlCol="0">
+                <a:spAutoFit/>
+              </a:bodyPr>
+              <a:lstStyle/>
+              <a:p>
+                <a:r>
+                  <a:rPr lang="en-US" sz="2000" b="1" dirty="0">
+                    <a:solidFill>
+                      <a:schemeClr val="bg1">
+                        <a:lumMod val="75000"/>
+                      </a:schemeClr>
+                    </a:solidFill>
+                  </a:rPr>
+                  <a:t>Other sensors (optional)</a:t>
+                </a:r>
+              </a:p>
+            </p:txBody>
+          </p:sp>
+          <p:cxnSp>
+            <p:nvCxnSpPr>
+              <p:cNvPr id="31" name="Straight Arrow Connector 30"/>
+              <p:cNvCxnSpPr/>
+              <p:nvPr/>
+            </p:nvCxnSpPr>
+            <p:spPr>
+              <a:xfrm>
+                <a:off x="9513120" y="1492217"/>
+                <a:ext cx="545082" cy="310143"/>
+              </a:xfrm>
+              <a:prstGeom prst="straightConnector1">
+                <a:avLst/>
+              </a:prstGeom>
+              <a:ln w="38100">
                 <a:solidFill>
                   <a:schemeClr val="bg1">
                     <a:lumMod val="75000"/>
                   </a:schemeClr>
                 </a:solidFill>
-              </a:rPr>
-              <a:t>Other sensors (optional)</a:t>
-            </a:r>
-          </a:p>
-        </p:txBody>
-      </p:sp>
-      <p:cxnSp>
-        <p:nvCxnSpPr>
-          <p:cNvPr id="31" name="Straight Arrow Connector 30"/>
-          <p:cNvCxnSpPr/>
-          <p:nvPr/>
-        </p:nvCxnSpPr>
-        <p:spPr>
-          <a:xfrm>
-            <a:off x="9513120" y="1492217"/>
-            <a:ext cx="545082" cy="310143"/>
-          </a:xfrm>
-          <a:prstGeom prst="straightConnector1">
-            <a:avLst/>
-          </a:prstGeom>
-          <a:ln w="38100">
-            <a:solidFill>
-              <a:schemeClr val="bg1">
-                <a:lumMod val="75000"/>
-              </a:schemeClr>
-            </a:solidFill>
-            <a:headEnd type="none"/>
-            <a:tailEnd type="triangle"/>
-          </a:ln>
-        </p:spPr>
-        <p:style>
-          <a:lnRef idx="1">
-            <a:schemeClr val="accent1"/>
-          </a:lnRef>
-          <a:fillRef idx="0">
-            <a:schemeClr val="accent1"/>
-          </a:fillRef>
-          <a:effectRef idx="0">
-            <a:schemeClr val="accent1"/>
-          </a:effectRef>
-          <a:fontRef idx="minor">
-            <a:schemeClr val="tx1"/>
-          </a:fontRef>
-        </p:style>
-      </p:cxnSp>
-      <p:cxnSp>
-        <p:nvCxnSpPr>
-          <p:cNvPr id="35" name="Straight Arrow Connector 34"/>
-          <p:cNvCxnSpPr/>
-          <p:nvPr/>
-        </p:nvCxnSpPr>
-        <p:spPr>
-          <a:xfrm flipV="1">
-            <a:off x="7043520" y="2679436"/>
-            <a:ext cx="2248800" cy="19827"/>
-          </a:xfrm>
-          <a:prstGeom prst="straightConnector1">
-            <a:avLst/>
-          </a:prstGeom>
-          <a:ln w="38100">
-            <a:headEnd type="none"/>
-            <a:tailEnd type="triangle"/>
-          </a:ln>
-        </p:spPr>
-        <p:style>
-          <a:lnRef idx="1">
-            <a:schemeClr val="accent1"/>
-          </a:lnRef>
-          <a:fillRef idx="0">
-            <a:schemeClr val="accent1"/>
-          </a:fillRef>
-          <a:effectRef idx="0">
-            <a:schemeClr val="accent1"/>
-          </a:effectRef>
-          <a:fontRef idx="minor">
-            <a:schemeClr val="tx1"/>
-          </a:fontRef>
-        </p:style>
-      </p:cxnSp>
-      <p:cxnSp>
-        <p:nvCxnSpPr>
-          <p:cNvPr id="39" name="Straight Arrow Connector 38"/>
-          <p:cNvCxnSpPr/>
-          <p:nvPr/>
-        </p:nvCxnSpPr>
-        <p:spPr>
-          <a:xfrm>
-            <a:off x="10610307" y="3243518"/>
-            <a:ext cx="0" cy="667001"/>
-          </a:xfrm>
-          <a:prstGeom prst="straightConnector1">
-            <a:avLst/>
-          </a:prstGeom>
-          <a:ln w="38100">
-            <a:headEnd type="none"/>
-            <a:tailEnd type="triangle"/>
-          </a:ln>
-        </p:spPr>
-        <p:style>
-          <a:lnRef idx="1">
-            <a:schemeClr val="accent1"/>
-          </a:lnRef>
-          <a:fillRef idx="0">
-            <a:schemeClr val="accent1"/>
-          </a:fillRef>
-          <a:effectRef idx="0">
-            <a:schemeClr val="accent1"/>
-          </a:effectRef>
-          <a:fontRef idx="minor">
-            <a:schemeClr val="tx1"/>
-          </a:fontRef>
-        </p:style>
-      </p:cxnSp>
-      <p:pic>
-        <p:nvPicPr>
-          <p:cNvPr id="46" name="Picture 45"/>
-          <p:cNvPicPr>
-            <a:picLocks noChangeAspect="1"/>
-          </p:cNvPicPr>
-          <p:nvPr/>
-        </p:nvPicPr>
-        <p:blipFill>
-          <a:blip r:embed="rId11">
-            <a:extLst>
-              <a:ext uri="{28A0092B-C50C-407E-A947-70E740481C1C}">
-                <a14:useLocalDpi xmlns:a14="http://schemas.microsoft.com/office/drawing/2010/main" val="0"/>
-              </a:ext>
-            </a:extLst>
-          </a:blip>
-          <a:stretch>
-            <a:fillRect/>
-          </a:stretch>
-        </p:blipFill>
-        <p:spPr>
-          <a:xfrm>
-            <a:off x="9785661" y="3910519"/>
-            <a:ext cx="1428750" cy="1428750"/>
-          </a:xfrm>
-          <a:prstGeom prst="rect">
-            <a:avLst/>
-          </a:prstGeom>
-        </p:spPr>
-      </p:pic>
-      <p:sp>
-        <p:nvSpPr>
-          <p:cNvPr id="48" name="TextBox 47"/>
-          <p:cNvSpPr txBox="1"/>
-          <p:nvPr/>
-        </p:nvSpPr>
-        <p:spPr>
-          <a:xfrm>
-            <a:off x="9596175" y="5249066"/>
-            <a:ext cx="2028266" cy="707886"/>
-          </a:xfrm>
-          <a:prstGeom prst="rect">
-            <a:avLst/>
-          </a:prstGeom>
-          <a:noFill/>
-        </p:spPr>
-        <p:txBody>
-          <a:bodyPr wrap="square" rtlCol="0">
-            <a:spAutoFit/>
-          </a:bodyPr>
-          <a:lstStyle/>
-          <a:p>
-            <a:pPr algn="ctr"/>
-            <a:r>
-              <a:rPr lang="en-US" sz="2000" b="1" dirty="0">
-                <a:solidFill>
-                  <a:srgbClr val="7030A0"/>
-                </a:solidFill>
-              </a:rPr>
-              <a:t>Azure Stream Analytics</a:t>
-            </a:r>
-          </a:p>
-        </p:txBody>
-      </p:sp>
-      <p:cxnSp>
-        <p:nvCxnSpPr>
-          <p:cNvPr id="49" name="Straight Arrow Connector 48"/>
-          <p:cNvCxnSpPr/>
-          <p:nvPr/>
-        </p:nvCxnSpPr>
-        <p:spPr>
-          <a:xfrm flipH="1">
-            <a:off x="8540669" y="4383845"/>
-            <a:ext cx="1244992" cy="2555"/>
-          </a:xfrm>
-          <a:prstGeom prst="straightConnector1">
-            <a:avLst/>
-          </a:prstGeom>
-          <a:ln w="38100">
-            <a:headEnd type="none"/>
-            <a:tailEnd type="triangle"/>
-          </a:ln>
-        </p:spPr>
-        <p:style>
-          <a:lnRef idx="1">
-            <a:schemeClr val="accent1"/>
-          </a:lnRef>
-          <a:fillRef idx="0">
-            <a:schemeClr val="accent1"/>
-          </a:fillRef>
-          <a:effectRef idx="0">
-            <a:schemeClr val="accent1"/>
-          </a:effectRef>
-          <a:fontRef idx="minor">
-            <a:schemeClr val="tx1"/>
-          </a:fontRef>
-        </p:style>
-      </p:cxnSp>
-      <p:pic>
-        <p:nvPicPr>
-          <p:cNvPr id="51" name="Picture 50"/>
-          <p:cNvPicPr>
-            <a:picLocks noChangeAspect="1"/>
-          </p:cNvPicPr>
-          <p:nvPr/>
-        </p:nvPicPr>
-        <p:blipFill>
-          <a:blip r:embed="rId12">
-            <a:extLst>
-              <a:ext uri="{28A0092B-C50C-407E-A947-70E740481C1C}">
-                <a14:useLocalDpi xmlns:a14="http://schemas.microsoft.com/office/drawing/2010/main" val="0"/>
-              </a:ext>
-            </a:extLst>
-          </a:blip>
-          <a:stretch>
-            <a:fillRect/>
-          </a:stretch>
-        </p:blipFill>
-        <p:spPr>
-          <a:xfrm>
-            <a:off x="7196039" y="3703384"/>
-            <a:ext cx="1189948" cy="1189948"/>
-          </a:xfrm>
-          <a:prstGeom prst="rect">
-            <a:avLst/>
-          </a:prstGeom>
-        </p:spPr>
-      </p:pic>
-      <p:sp>
-        <p:nvSpPr>
-          <p:cNvPr id="53" name="TextBox 52"/>
-          <p:cNvSpPr txBox="1"/>
-          <p:nvPr/>
-        </p:nvSpPr>
-        <p:spPr>
-          <a:xfrm>
-            <a:off x="6550170" y="5556842"/>
-            <a:ext cx="2028266" cy="400110"/>
-          </a:xfrm>
-          <a:prstGeom prst="rect">
-            <a:avLst/>
-          </a:prstGeom>
-          <a:noFill/>
-        </p:spPr>
-        <p:txBody>
-          <a:bodyPr wrap="square" rtlCol="0">
-            <a:spAutoFit/>
-          </a:bodyPr>
-          <a:lstStyle/>
-          <a:p>
-            <a:pPr algn="ctr"/>
-            <a:r>
-              <a:rPr lang="en-US" sz="2000" b="1" dirty="0">
-                <a:solidFill>
-                  <a:srgbClr val="7030A0"/>
-                </a:solidFill>
-              </a:rPr>
-              <a:t>PowerBi</a:t>
-            </a:r>
-          </a:p>
-        </p:txBody>
-      </p:sp>
-      <p:cxnSp>
-        <p:nvCxnSpPr>
-          <p:cNvPr id="54" name="Straight Arrow Connector 53"/>
-          <p:cNvCxnSpPr/>
-          <p:nvPr/>
-        </p:nvCxnSpPr>
-        <p:spPr>
-          <a:xfrm flipH="1" flipV="1">
-            <a:off x="6335035" y="4425916"/>
-            <a:ext cx="710531" cy="21194"/>
-          </a:xfrm>
-          <a:prstGeom prst="straightConnector1">
-            <a:avLst/>
-          </a:prstGeom>
-          <a:ln w="38100">
-            <a:headEnd type="none"/>
-            <a:tailEnd type="triangle"/>
-          </a:ln>
-        </p:spPr>
-        <p:style>
-          <a:lnRef idx="1">
-            <a:schemeClr val="accent1"/>
-          </a:lnRef>
-          <a:fillRef idx="0">
-            <a:schemeClr val="accent1"/>
-          </a:fillRef>
-          <a:effectRef idx="0">
-            <a:schemeClr val="accent1"/>
-          </a:effectRef>
-          <a:fontRef idx="minor">
-            <a:schemeClr val="tx1"/>
-          </a:fontRef>
-        </p:style>
-      </p:cxnSp>
-      <p:pic>
-        <p:nvPicPr>
-          <p:cNvPr id="63" name="Picture 62"/>
-          <p:cNvPicPr>
-            <a:picLocks noChangeAspect="1"/>
-          </p:cNvPicPr>
-          <p:nvPr/>
-        </p:nvPicPr>
-        <p:blipFill>
-          <a:blip r:embed="rId13"/>
-          <a:stretch>
-            <a:fillRect/>
-          </a:stretch>
-        </p:blipFill>
-        <p:spPr>
-          <a:xfrm>
-            <a:off x="3827485" y="3312295"/>
-            <a:ext cx="2334183" cy="1312599"/>
-          </a:xfrm>
-          <a:prstGeom prst="rect">
-            <a:avLst/>
-          </a:prstGeom>
-          <a:solidFill>
-            <a:srgbClr val="FFFFFF">
-              <a:shade val="85000"/>
-            </a:srgbClr>
-          </a:solidFill>
-          <a:ln w="88900" cap="sq">
-            <a:solidFill>
-              <a:srgbClr val="FFFFFF"/>
-            </a:solidFill>
-            <a:miter lim="800000"/>
-          </a:ln>
-          <a:effectLst>
-            <a:outerShdw blurRad="55000" dist="18000" dir="5400000" algn="tl" rotWithShape="0">
-              <a:srgbClr val="000000">
-                <a:alpha val="40000"/>
-              </a:srgbClr>
-            </a:outerShdw>
-          </a:effectLst>
-          <a:scene3d>
-            <a:camera prst="orthographicFront"/>
-            <a:lightRig rig="twoPt" dir="t">
-              <a:rot lat="0" lon="0" rev="7200000"/>
-            </a:lightRig>
-          </a:scene3d>
-          <a:sp3d>
-            <a:bevelT w="25400" h="19050"/>
-            <a:contourClr>
-              <a:srgbClr val="FFFFFF"/>
-            </a:contourClr>
-          </a:sp3d>
-        </p:spPr>
-      </p:pic>
-      <p:pic>
-        <p:nvPicPr>
-          <p:cNvPr id="1028" name="Picture 1027"/>
-          <p:cNvPicPr>
-            <a:picLocks noChangeAspect="1"/>
-          </p:cNvPicPr>
-          <p:nvPr/>
-        </p:nvPicPr>
-        <p:blipFill>
-          <a:blip r:embed="rId14">
-            <a:extLst>
-              <a:ext uri="{28A0092B-C50C-407E-A947-70E740481C1C}">
-                <a14:useLocalDpi xmlns:a14="http://schemas.microsoft.com/office/drawing/2010/main" val="0"/>
-              </a:ext>
-            </a:extLst>
-          </a:blip>
-          <a:stretch>
-            <a:fillRect/>
-          </a:stretch>
-        </p:blipFill>
-        <p:spPr>
-          <a:xfrm>
-            <a:off x="8689073" y="5643325"/>
-            <a:ext cx="1013763" cy="1013763"/>
-          </a:xfrm>
-          <a:prstGeom prst="rect">
-            <a:avLst/>
-          </a:prstGeom>
-        </p:spPr>
-      </p:pic>
-      <p:cxnSp>
-        <p:nvCxnSpPr>
-          <p:cNvPr id="69" name="Straight Arrow Connector 68"/>
-          <p:cNvCxnSpPr/>
-          <p:nvPr/>
-        </p:nvCxnSpPr>
-        <p:spPr>
-          <a:xfrm flipH="1">
-            <a:off x="9785661" y="6027006"/>
-            <a:ext cx="892590" cy="348674"/>
-          </a:xfrm>
-          <a:prstGeom prst="straightConnector1">
-            <a:avLst/>
-          </a:prstGeom>
-          <a:ln w="38100">
-            <a:solidFill>
-              <a:schemeClr val="bg1">
-                <a:lumMod val="75000"/>
-              </a:schemeClr>
-            </a:solidFill>
-            <a:headEnd type="none"/>
-            <a:tailEnd type="triangle"/>
-          </a:ln>
-        </p:spPr>
-        <p:style>
-          <a:lnRef idx="1">
-            <a:schemeClr val="accent1"/>
-          </a:lnRef>
-          <a:fillRef idx="0">
-            <a:schemeClr val="accent1"/>
-          </a:fillRef>
-          <a:effectRef idx="0">
-            <a:schemeClr val="accent1"/>
-          </a:effectRef>
-          <a:fontRef idx="minor">
-            <a:schemeClr val="tx1"/>
-          </a:fontRef>
-        </p:style>
-      </p:cxnSp>
-      <p:cxnSp>
-        <p:nvCxnSpPr>
-          <p:cNvPr id="71" name="Straight Arrow Connector 70"/>
-          <p:cNvCxnSpPr/>
-          <p:nvPr/>
-        </p:nvCxnSpPr>
-        <p:spPr>
-          <a:xfrm flipH="1" flipV="1">
-            <a:off x="8167920" y="5390521"/>
-            <a:ext cx="460901" cy="474910"/>
-          </a:xfrm>
-          <a:prstGeom prst="straightConnector1">
-            <a:avLst/>
-          </a:prstGeom>
-          <a:ln w="38100">
-            <a:solidFill>
-              <a:schemeClr val="bg1">
-                <a:lumMod val="75000"/>
-              </a:schemeClr>
-            </a:solidFill>
-            <a:headEnd type="none"/>
-            <a:tailEnd type="triangle"/>
-          </a:ln>
-        </p:spPr>
-        <p:style>
-          <a:lnRef idx="1">
-            <a:schemeClr val="accent1"/>
-          </a:lnRef>
-          <a:fillRef idx="0">
-            <a:schemeClr val="accent1"/>
-          </a:fillRef>
-          <a:effectRef idx="0">
-            <a:schemeClr val="accent1"/>
-          </a:effectRef>
-          <a:fontRef idx="minor">
-            <a:schemeClr val="tx1"/>
-          </a:fontRef>
-        </p:style>
-      </p:cxnSp>
-      <p:cxnSp>
-        <p:nvCxnSpPr>
-          <p:cNvPr id="73" name="Straight Arrow Connector 72"/>
-          <p:cNvCxnSpPr/>
-          <p:nvPr/>
-        </p:nvCxnSpPr>
-        <p:spPr>
-          <a:xfrm flipH="1">
-            <a:off x="6528818" y="5390521"/>
-            <a:ext cx="514702" cy="474909"/>
-          </a:xfrm>
-          <a:prstGeom prst="straightConnector1">
-            <a:avLst/>
-          </a:prstGeom>
-          <a:ln w="38100">
-            <a:solidFill>
-              <a:schemeClr val="bg1">
-                <a:lumMod val="75000"/>
-              </a:schemeClr>
-            </a:solidFill>
-            <a:headEnd type="none"/>
-            <a:tailEnd type="triangle"/>
-          </a:ln>
-        </p:spPr>
-        <p:style>
-          <a:lnRef idx="1">
-            <a:schemeClr val="accent1"/>
-          </a:lnRef>
-          <a:fillRef idx="0">
-            <a:schemeClr val="accent1"/>
-          </a:fillRef>
-          <a:effectRef idx="0">
-            <a:schemeClr val="accent1"/>
-          </a:effectRef>
-          <a:fontRef idx="minor">
-            <a:schemeClr val="tx1"/>
-          </a:fontRef>
-        </p:style>
-      </p:cxnSp>
-      <p:cxnSp>
-        <p:nvCxnSpPr>
-          <p:cNvPr id="75" name="Straight Arrow Connector 74"/>
-          <p:cNvCxnSpPr/>
-          <p:nvPr/>
-        </p:nvCxnSpPr>
-        <p:spPr>
-          <a:xfrm flipH="1" flipV="1">
-            <a:off x="2177089" y="3198165"/>
-            <a:ext cx="1460910" cy="515397"/>
-          </a:xfrm>
-          <a:prstGeom prst="straightConnector1">
-            <a:avLst/>
-          </a:prstGeom>
-          <a:ln w="38100">
-            <a:headEnd type="none"/>
-            <a:tailEnd type="triangle"/>
-          </a:ln>
-        </p:spPr>
-        <p:style>
-          <a:lnRef idx="1">
-            <a:schemeClr val="accent1"/>
-          </a:lnRef>
-          <a:fillRef idx="0">
-            <a:schemeClr val="accent1"/>
-          </a:fillRef>
-          <a:effectRef idx="0">
-            <a:schemeClr val="accent1"/>
-          </a:effectRef>
-          <a:fontRef idx="minor">
-            <a:schemeClr val="tx1"/>
-          </a:fontRef>
-        </p:style>
-      </p:cxnSp>
-      <p:pic>
-        <p:nvPicPr>
-          <p:cNvPr id="77" name="Picture 2" descr="C:\Users\t-dantay\Documents\Placeholders\user.png"/>
-          <p:cNvPicPr>
-            <a:picLocks noChangeAspect="1" noChangeArrowheads="1"/>
-          </p:cNvPicPr>
-          <p:nvPr>
-            <p:custDataLst>
-              <p:custData r:id="rId4"/>
-            </p:custDataLst>
-          </p:nvPr>
-        </p:nvPicPr>
-        <p:blipFill>
-          <a:blip r:embed="rId7" cstate="print">
-            <a:extLst>
-              <a:ext uri="{28A0092B-C50C-407E-A947-70E740481C1C}">
-                <a14:useLocalDpi xmlns:a14="http://schemas.microsoft.com/office/drawing/2010/main" val="0"/>
-              </a:ext>
-            </a:extLst>
-          </a:blip>
-          <a:srcRect/>
-          <a:stretch>
-            <a:fillRect/>
-          </a:stretch>
-        </p:blipFill>
-        <p:spPr bwMode="auto">
-          <a:xfrm>
-            <a:off x="1568114" y="612358"/>
-            <a:ext cx="410924" cy="518615"/>
-          </a:xfrm>
-          <a:prstGeom prst="rect">
-            <a:avLst/>
-          </a:prstGeom>
-          <a:noFill/>
-          <a:extLst>
-            <a:ext uri="{909E8E84-426E-40DD-AFC4-6F175D3DCCD1}">
-              <a14:hiddenFill xmlns:a14="http://schemas.microsoft.com/office/drawing/2010/main">
+                <a:headEnd type="none"/>
+                <a:tailEnd type="triangle"/>
+              </a:ln>
+            </p:spPr>
+            <p:style>
+              <a:lnRef idx="1">
+                <a:schemeClr val="accent1"/>
+              </a:lnRef>
+              <a:fillRef idx="0">
+                <a:schemeClr val="accent1"/>
+              </a:fillRef>
+              <a:effectRef idx="0">
+                <a:schemeClr val="accent1"/>
+              </a:effectRef>
+              <a:fontRef idx="minor">
+                <a:schemeClr val="tx1"/>
+              </a:fontRef>
+            </p:style>
+          </p:cxnSp>
+          <p:cxnSp>
+            <p:nvCxnSpPr>
+              <p:cNvPr id="35" name="Straight Arrow Connector 34"/>
+              <p:cNvCxnSpPr/>
+              <p:nvPr/>
+            </p:nvCxnSpPr>
+            <p:spPr>
+              <a:xfrm flipV="1">
+                <a:off x="7043520" y="2679436"/>
+                <a:ext cx="2248800" cy="19827"/>
+              </a:xfrm>
+              <a:prstGeom prst="straightConnector1">
+                <a:avLst/>
+              </a:prstGeom>
+              <a:ln w="38100">
+                <a:headEnd type="none"/>
+                <a:tailEnd type="triangle"/>
+              </a:ln>
+            </p:spPr>
+            <p:style>
+              <a:lnRef idx="1">
+                <a:schemeClr val="accent1"/>
+              </a:lnRef>
+              <a:fillRef idx="0">
+                <a:schemeClr val="accent1"/>
+              </a:fillRef>
+              <a:effectRef idx="0">
+                <a:schemeClr val="accent1"/>
+              </a:effectRef>
+              <a:fontRef idx="minor">
+                <a:schemeClr val="tx1"/>
+              </a:fontRef>
+            </p:style>
+          </p:cxnSp>
+          <p:cxnSp>
+            <p:nvCxnSpPr>
+              <p:cNvPr id="39" name="Straight Arrow Connector 38"/>
+              <p:cNvCxnSpPr/>
+              <p:nvPr/>
+            </p:nvCxnSpPr>
+            <p:spPr>
+              <a:xfrm>
+                <a:off x="10610307" y="3243518"/>
+                <a:ext cx="0" cy="667001"/>
+              </a:xfrm>
+              <a:prstGeom prst="straightConnector1">
+                <a:avLst/>
+              </a:prstGeom>
+              <a:ln w="38100">
+                <a:headEnd type="none"/>
+                <a:tailEnd type="triangle"/>
+              </a:ln>
+            </p:spPr>
+            <p:style>
+              <a:lnRef idx="1">
+                <a:schemeClr val="accent1"/>
+              </a:lnRef>
+              <a:fillRef idx="0">
+                <a:schemeClr val="accent1"/>
+              </a:fillRef>
+              <a:effectRef idx="0">
+                <a:schemeClr val="accent1"/>
+              </a:effectRef>
+              <a:fontRef idx="minor">
+                <a:schemeClr val="tx1"/>
+              </a:fontRef>
+            </p:style>
+          </p:cxnSp>
+          <p:pic>
+            <p:nvPicPr>
+              <p:cNvPr id="46" name="Picture 45"/>
+              <p:cNvPicPr>
+                <a:picLocks noChangeAspect="1"/>
+              </p:cNvPicPr>
+              <p:nvPr/>
+            </p:nvPicPr>
+            <p:blipFill>
+              <a:blip r:embed="rId10">
+                <a:extLst>
+                  <a:ext uri="{28A0092B-C50C-407E-A947-70E740481C1C}">
+                    <a14:useLocalDpi xmlns:a14="http://schemas.microsoft.com/office/drawing/2010/main" val="0"/>
+                  </a:ext>
+                </a:extLst>
+              </a:blip>
+              <a:stretch>
+                <a:fillRect/>
+              </a:stretch>
+            </p:blipFill>
+            <p:spPr>
+              <a:xfrm>
+                <a:off x="9785661" y="3910519"/>
+                <a:ext cx="1428750" cy="1428750"/>
+              </a:xfrm>
+              <a:prstGeom prst="rect">
+                <a:avLst/>
+              </a:prstGeom>
+            </p:spPr>
+          </p:pic>
+          <p:sp>
+            <p:nvSpPr>
+              <p:cNvPr id="48" name="TextBox 47"/>
+              <p:cNvSpPr txBox="1"/>
+              <p:nvPr/>
+            </p:nvSpPr>
+            <p:spPr>
+              <a:xfrm>
+                <a:off x="9596175" y="5249066"/>
+                <a:ext cx="2028266" cy="707886"/>
+              </a:xfrm>
+              <a:prstGeom prst="rect">
+                <a:avLst/>
+              </a:prstGeom>
+              <a:noFill/>
+            </p:spPr>
+            <p:txBody>
+              <a:bodyPr wrap="square" rtlCol="0">
+                <a:spAutoFit/>
+              </a:bodyPr>
+              <a:lstStyle/>
+              <a:p>
+                <a:pPr algn="ctr"/>
+                <a:r>
+                  <a:rPr lang="en-US" sz="2000" b="1" dirty="0">
+                    <a:solidFill>
+                      <a:srgbClr val="7030A0"/>
+                    </a:solidFill>
+                  </a:rPr>
+                  <a:t>Azure Stream Analytics</a:t>
+                </a:r>
+              </a:p>
+            </p:txBody>
+          </p:sp>
+          <p:cxnSp>
+            <p:nvCxnSpPr>
+              <p:cNvPr id="49" name="Straight Arrow Connector 48"/>
+              <p:cNvCxnSpPr/>
+              <p:nvPr/>
+            </p:nvCxnSpPr>
+            <p:spPr>
+              <a:xfrm flipH="1">
+                <a:off x="8540669" y="4383845"/>
+                <a:ext cx="1244992" cy="2555"/>
+              </a:xfrm>
+              <a:prstGeom prst="straightConnector1">
+                <a:avLst/>
+              </a:prstGeom>
+              <a:ln w="38100">
+                <a:headEnd type="none"/>
+                <a:tailEnd type="triangle"/>
+              </a:ln>
+            </p:spPr>
+            <p:style>
+              <a:lnRef idx="1">
+                <a:schemeClr val="accent1"/>
+              </a:lnRef>
+              <a:fillRef idx="0">
+                <a:schemeClr val="accent1"/>
+              </a:fillRef>
+              <a:effectRef idx="0">
+                <a:schemeClr val="accent1"/>
+              </a:effectRef>
+              <a:fontRef idx="minor">
+                <a:schemeClr val="tx1"/>
+              </a:fontRef>
+            </p:style>
+          </p:cxnSp>
+          <p:pic>
+            <p:nvPicPr>
+              <p:cNvPr id="51" name="Picture 50"/>
+              <p:cNvPicPr>
+                <a:picLocks noChangeAspect="1"/>
+              </p:cNvPicPr>
+              <p:nvPr/>
+            </p:nvPicPr>
+            <p:blipFill>
+              <a:blip r:embed="rId11">
+                <a:extLst>
+                  <a:ext uri="{28A0092B-C50C-407E-A947-70E740481C1C}">
+                    <a14:useLocalDpi xmlns:a14="http://schemas.microsoft.com/office/drawing/2010/main" val="0"/>
+                  </a:ext>
+                </a:extLst>
+              </a:blip>
+              <a:stretch>
+                <a:fillRect/>
+              </a:stretch>
+            </p:blipFill>
+            <p:spPr>
+              <a:xfrm>
+                <a:off x="7196039" y="3703384"/>
+                <a:ext cx="1189948" cy="1189948"/>
+              </a:xfrm>
+              <a:prstGeom prst="rect">
+                <a:avLst/>
+              </a:prstGeom>
+            </p:spPr>
+          </p:pic>
+          <p:sp>
+            <p:nvSpPr>
+              <p:cNvPr id="53" name="TextBox 52"/>
+              <p:cNvSpPr txBox="1"/>
+              <p:nvPr/>
+            </p:nvSpPr>
+            <p:spPr>
+              <a:xfrm>
+                <a:off x="6550170" y="5556842"/>
+                <a:ext cx="2028266" cy="400110"/>
+              </a:xfrm>
+              <a:prstGeom prst="rect">
+                <a:avLst/>
+              </a:prstGeom>
+              <a:noFill/>
+            </p:spPr>
+            <p:txBody>
+              <a:bodyPr wrap="square" rtlCol="0">
+                <a:spAutoFit/>
+              </a:bodyPr>
+              <a:lstStyle/>
+              <a:p>
+                <a:pPr algn="ctr"/>
+                <a:r>
+                  <a:rPr lang="en-US" sz="2000" b="1" dirty="0">
+                    <a:solidFill>
+                      <a:srgbClr val="7030A0"/>
+                    </a:solidFill>
+                  </a:rPr>
+                  <a:t>PowerBi</a:t>
+                </a:r>
+              </a:p>
+            </p:txBody>
+          </p:sp>
+          <p:cxnSp>
+            <p:nvCxnSpPr>
+              <p:cNvPr id="54" name="Straight Arrow Connector 53"/>
+              <p:cNvCxnSpPr/>
+              <p:nvPr/>
+            </p:nvCxnSpPr>
+            <p:spPr>
+              <a:xfrm flipH="1" flipV="1">
+                <a:off x="6335035" y="4425916"/>
+                <a:ext cx="710531" cy="21194"/>
+              </a:xfrm>
+              <a:prstGeom prst="straightConnector1">
+                <a:avLst/>
+              </a:prstGeom>
+              <a:ln w="38100">
+                <a:headEnd type="none"/>
+                <a:tailEnd type="triangle"/>
+              </a:ln>
+            </p:spPr>
+            <p:style>
+              <a:lnRef idx="1">
+                <a:schemeClr val="accent1"/>
+              </a:lnRef>
+              <a:fillRef idx="0">
+                <a:schemeClr val="accent1"/>
+              </a:fillRef>
+              <a:effectRef idx="0">
+                <a:schemeClr val="accent1"/>
+              </a:effectRef>
+              <a:fontRef idx="minor">
+                <a:schemeClr val="tx1"/>
+              </a:fontRef>
+            </p:style>
+          </p:cxnSp>
+          <p:pic>
+            <p:nvPicPr>
+              <p:cNvPr id="63" name="Picture 62"/>
+              <p:cNvPicPr>
+                <a:picLocks noChangeAspect="1"/>
+              </p:cNvPicPr>
+              <p:nvPr/>
+            </p:nvPicPr>
+            <p:blipFill>
+              <a:blip r:embed="rId12"/>
+              <a:stretch>
+                <a:fillRect/>
+              </a:stretch>
+            </p:blipFill>
+            <p:spPr>
+              <a:xfrm>
+                <a:off x="3827485" y="3312295"/>
+                <a:ext cx="2334183" cy="1312599"/>
+              </a:xfrm>
+              <a:prstGeom prst="rect">
+                <a:avLst/>
+              </a:prstGeom>
+              <a:solidFill>
+                <a:srgbClr val="FFFFFF">
+                  <a:shade val="85000"/>
+                </a:srgbClr>
+              </a:solidFill>
+              <a:ln w="88900" cap="sq">
                 <a:solidFill>
                   <a:srgbClr val="FFFFFF"/>
                 </a:solidFill>
-              </a14:hiddenFill>
-            </a:ext>
-          </a:extLst>
-        </p:spPr>
-      </p:pic>
-      <p:pic>
-        <p:nvPicPr>
-          <p:cNvPr id="81" name="Content Placeholder 3"/>
-          <p:cNvPicPr>
-            <a:picLocks noChangeAspect="1"/>
-          </p:cNvPicPr>
-          <p:nvPr/>
-        </p:nvPicPr>
-        <p:blipFill>
-          <a:blip r:embed="rId15">
+                <a:miter lim="800000"/>
+              </a:ln>
+              <a:effectLst>
+                <a:outerShdw blurRad="55000" dist="18000" dir="5400000" algn="tl" rotWithShape="0">
+                  <a:srgbClr val="000000">
+                    <a:alpha val="40000"/>
+                  </a:srgbClr>
+                </a:outerShdw>
+              </a:effectLst>
+              <a:scene3d>
+                <a:camera prst="orthographicFront"/>
+                <a:lightRig rig="twoPt" dir="t">
+                  <a:rot lat="0" lon="0" rev="7200000"/>
+                </a:lightRig>
+              </a:scene3d>
+              <a:sp3d>
+                <a:bevelT w="25400" h="19050"/>
+                <a:contourClr>
+                  <a:srgbClr val="FFFFFF"/>
+                </a:contourClr>
+              </a:sp3d>
+            </p:spPr>
+          </p:pic>
+          <p:pic>
+            <p:nvPicPr>
+              <p:cNvPr id="1028" name="Picture 1027"/>
+              <p:cNvPicPr>
+                <a:picLocks noChangeAspect="1"/>
+              </p:cNvPicPr>
+              <p:nvPr/>
+            </p:nvPicPr>
+            <p:blipFill>
+              <a:blip r:embed="rId13">
+                <a:extLst>
+                  <a:ext uri="{28A0092B-C50C-407E-A947-70E740481C1C}">
+                    <a14:useLocalDpi xmlns:a14="http://schemas.microsoft.com/office/drawing/2010/main" val="0"/>
+                  </a:ext>
+                </a:extLst>
+              </a:blip>
+              <a:stretch>
+                <a:fillRect/>
+              </a:stretch>
+            </p:blipFill>
+            <p:spPr>
+              <a:xfrm>
+                <a:off x="8689073" y="5643325"/>
+                <a:ext cx="1013763" cy="1013763"/>
+              </a:xfrm>
+              <a:prstGeom prst="rect">
+                <a:avLst/>
+              </a:prstGeom>
+            </p:spPr>
+          </p:pic>
+          <p:cxnSp>
+            <p:nvCxnSpPr>
+              <p:cNvPr id="69" name="Straight Arrow Connector 68"/>
+              <p:cNvCxnSpPr/>
+              <p:nvPr/>
+            </p:nvCxnSpPr>
+            <p:spPr>
+              <a:xfrm flipH="1">
+                <a:off x="9785661" y="6027006"/>
+                <a:ext cx="892590" cy="348674"/>
+              </a:xfrm>
+              <a:prstGeom prst="straightConnector1">
+                <a:avLst/>
+              </a:prstGeom>
+              <a:ln w="38100">
+                <a:solidFill>
+                  <a:schemeClr val="bg1">
+                    <a:lumMod val="75000"/>
+                  </a:schemeClr>
+                </a:solidFill>
+                <a:headEnd type="none"/>
+                <a:tailEnd type="triangle"/>
+              </a:ln>
+            </p:spPr>
+            <p:style>
+              <a:lnRef idx="1">
+                <a:schemeClr val="accent1"/>
+              </a:lnRef>
+              <a:fillRef idx="0">
+                <a:schemeClr val="accent1"/>
+              </a:fillRef>
+              <a:effectRef idx="0">
+                <a:schemeClr val="accent1"/>
+              </a:effectRef>
+              <a:fontRef idx="minor">
+                <a:schemeClr val="tx1"/>
+              </a:fontRef>
+            </p:style>
+          </p:cxnSp>
+          <p:cxnSp>
+            <p:nvCxnSpPr>
+              <p:cNvPr id="71" name="Straight Arrow Connector 70"/>
+              <p:cNvCxnSpPr/>
+              <p:nvPr/>
+            </p:nvCxnSpPr>
+            <p:spPr>
+              <a:xfrm flipH="1" flipV="1">
+                <a:off x="8167920" y="5390521"/>
+                <a:ext cx="460901" cy="474910"/>
+              </a:xfrm>
+              <a:prstGeom prst="straightConnector1">
+                <a:avLst/>
+              </a:prstGeom>
+              <a:ln w="38100">
+                <a:solidFill>
+                  <a:schemeClr val="bg1">
+                    <a:lumMod val="75000"/>
+                  </a:schemeClr>
+                </a:solidFill>
+                <a:headEnd type="none"/>
+                <a:tailEnd type="triangle"/>
+              </a:ln>
+            </p:spPr>
+            <p:style>
+              <a:lnRef idx="1">
+                <a:schemeClr val="accent1"/>
+              </a:lnRef>
+              <a:fillRef idx="0">
+                <a:schemeClr val="accent1"/>
+              </a:fillRef>
+              <a:effectRef idx="0">
+                <a:schemeClr val="accent1"/>
+              </a:effectRef>
+              <a:fontRef idx="minor">
+                <a:schemeClr val="tx1"/>
+              </a:fontRef>
+            </p:style>
+          </p:cxnSp>
+          <p:cxnSp>
+            <p:nvCxnSpPr>
+              <p:cNvPr id="73" name="Straight Arrow Connector 72"/>
+              <p:cNvCxnSpPr/>
+              <p:nvPr/>
+            </p:nvCxnSpPr>
+            <p:spPr>
+              <a:xfrm flipH="1">
+                <a:off x="6528818" y="5390521"/>
+                <a:ext cx="514702" cy="474909"/>
+              </a:xfrm>
+              <a:prstGeom prst="straightConnector1">
+                <a:avLst/>
+              </a:prstGeom>
+              <a:ln w="38100">
+                <a:solidFill>
+                  <a:schemeClr val="bg1">
+                    <a:lumMod val="75000"/>
+                  </a:schemeClr>
+                </a:solidFill>
+                <a:headEnd type="none"/>
+                <a:tailEnd type="triangle"/>
+              </a:ln>
+            </p:spPr>
+            <p:style>
+              <a:lnRef idx="1">
+                <a:schemeClr val="accent1"/>
+              </a:lnRef>
+              <a:fillRef idx="0">
+                <a:schemeClr val="accent1"/>
+              </a:fillRef>
+              <a:effectRef idx="0">
+                <a:schemeClr val="accent1"/>
+              </a:effectRef>
+              <a:fontRef idx="minor">
+                <a:schemeClr val="tx1"/>
+              </a:fontRef>
+            </p:style>
+          </p:cxnSp>
+          <p:cxnSp>
+            <p:nvCxnSpPr>
+              <p:cNvPr id="75" name="Straight Arrow Connector 74"/>
+              <p:cNvCxnSpPr/>
+              <p:nvPr/>
+            </p:nvCxnSpPr>
+            <p:spPr>
+              <a:xfrm flipH="1" flipV="1">
+                <a:off x="2177089" y="3198165"/>
+                <a:ext cx="1460910" cy="515397"/>
+              </a:xfrm>
+              <a:prstGeom prst="straightConnector1">
+                <a:avLst/>
+              </a:prstGeom>
+              <a:ln w="38100">
+                <a:headEnd type="none"/>
+                <a:tailEnd type="triangle"/>
+              </a:ln>
+            </p:spPr>
+            <p:style>
+              <a:lnRef idx="1">
+                <a:schemeClr val="accent1"/>
+              </a:lnRef>
+              <a:fillRef idx="0">
+                <a:schemeClr val="accent1"/>
+              </a:fillRef>
+              <a:effectRef idx="0">
+                <a:schemeClr val="accent1"/>
+              </a:effectRef>
+              <a:fontRef idx="minor">
+                <a:schemeClr val="tx1"/>
+              </a:fontRef>
+            </p:style>
+          </p:cxnSp>
+          <p:pic>
+            <p:nvPicPr>
+              <p:cNvPr id="77" name="Picture 2" descr="C:\Users\t-dantay\Documents\Placeholders\user.png"/>
+              <p:cNvPicPr>
+                <a:picLocks noChangeAspect="1" noChangeArrowheads="1"/>
+              </p:cNvPicPr>
+              <p:nvPr>
+                <p:custDataLst>
+                  <p:custData r:id="rId4"/>
+                </p:custDataLst>
+              </p:nvPr>
+            </p:nvPicPr>
+            <p:blipFill>
+              <a:blip r:embed="rId7" cstate="print">
+                <a:extLst>
+                  <a:ext uri="{28A0092B-C50C-407E-A947-70E740481C1C}">
+                    <a14:useLocalDpi xmlns:a14="http://schemas.microsoft.com/office/drawing/2010/main" val="0"/>
+                  </a:ext>
+                </a:extLst>
+              </a:blip>
+              <a:srcRect/>
+              <a:stretch>
+                <a:fillRect/>
+              </a:stretch>
+            </p:blipFill>
+            <p:spPr bwMode="auto">
+              <a:xfrm>
+                <a:off x="1568114" y="612358"/>
+                <a:ext cx="410924" cy="518615"/>
+              </a:xfrm>
+              <a:prstGeom prst="rect">
+                <a:avLst/>
+              </a:prstGeom>
+              <a:noFill/>
+              <a:extLst>
+                <a:ext uri="{909E8E84-426E-40DD-AFC4-6F175D3DCCD1}">
+                  <a14:hiddenFill xmlns:a14="http://schemas.microsoft.com/office/drawing/2010/main">
+                    <a:solidFill>
+                      <a:srgbClr val="FFFFFF"/>
+                    </a:solidFill>
+                  </a14:hiddenFill>
+                </a:ext>
+              </a:extLst>
+            </p:spPr>
+          </p:pic>
+          <p:pic>
+            <p:nvPicPr>
+              <p:cNvPr id="81" name="Content Placeholder 3"/>
+              <p:cNvPicPr>
+                <a:picLocks noChangeAspect="1"/>
+              </p:cNvPicPr>
+              <p:nvPr/>
+            </p:nvPicPr>
+            <p:blipFill>
+              <a:blip r:embed="rId14">
+                <a:extLst>
+                  <a:ext uri="{28A0092B-C50C-407E-A947-70E740481C1C}">
+                    <a14:useLocalDpi xmlns:a14="http://schemas.microsoft.com/office/drawing/2010/main" val="0"/>
+                  </a:ext>
+                </a:extLst>
+              </a:blip>
+              <a:stretch>
+                <a:fillRect/>
+              </a:stretch>
+            </p:blipFill>
+            <p:spPr>
+              <a:xfrm>
+                <a:off x="4727250" y="5410322"/>
+                <a:ext cx="1518120" cy="717549"/>
+              </a:xfrm>
+              <a:prstGeom prst="rect">
+                <a:avLst/>
+              </a:prstGeom>
+              <a:solidFill>
+                <a:srgbClr val="FFFFFF">
+                  <a:shade val="85000"/>
+                </a:srgbClr>
+              </a:solidFill>
+              <a:ln w="88900" cap="sq">
+                <a:solidFill>
+                  <a:srgbClr val="FFFFFF"/>
+                </a:solidFill>
+                <a:miter lim="800000"/>
+              </a:ln>
+              <a:effectLst>
+                <a:outerShdw blurRad="55000" dist="18000" dir="5400000" algn="tl" rotWithShape="0">
+                  <a:srgbClr val="000000">
+                    <a:alpha val="40000"/>
+                  </a:srgbClr>
+                </a:outerShdw>
+              </a:effectLst>
+              <a:scene3d>
+                <a:camera prst="orthographicFront"/>
+                <a:lightRig rig="twoPt" dir="t">
+                  <a:rot lat="0" lon="0" rev="7200000"/>
+                </a:lightRig>
+              </a:scene3d>
+              <a:sp3d>
+                <a:bevelT w="25400" h="19050"/>
+                <a:contourClr>
+                  <a:srgbClr val="FFFFFF"/>
+                </a:contourClr>
+              </a:sp3d>
+            </p:spPr>
+          </p:pic>
+          <p:sp>
+            <p:nvSpPr>
+              <p:cNvPr id="82" name="TextBox 81"/>
+              <p:cNvSpPr txBox="1"/>
+              <p:nvPr/>
+            </p:nvSpPr>
+            <p:spPr>
+              <a:xfrm>
+                <a:off x="2451155" y="5486340"/>
+                <a:ext cx="2185340" cy="707886"/>
+              </a:xfrm>
+              <a:prstGeom prst="rect">
+                <a:avLst/>
+              </a:prstGeom>
+              <a:noFill/>
+            </p:spPr>
+            <p:txBody>
+              <a:bodyPr wrap="square" rtlCol="0">
+                <a:spAutoFit/>
+              </a:bodyPr>
+              <a:lstStyle/>
+              <a:p>
+                <a:pPr algn="r"/>
+                <a:r>
+                  <a:rPr lang="en-US" sz="2000" b="1" dirty="0">
+                    <a:solidFill>
+                      <a:srgbClr val="7030A0"/>
+                    </a:solidFill>
+                  </a:rPr>
+                  <a:t>Post event BI for internal marketers</a:t>
+                </a:r>
+              </a:p>
+            </p:txBody>
+          </p:sp>
+          <p:sp>
+            <p:nvSpPr>
+              <p:cNvPr id="83" name="TextBox 82"/>
+              <p:cNvSpPr txBox="1"/>
+              <p:nvPr/>
+            </p:nvSpPr>
+            <p:spPr>
+              <a:xfrm>
+                <a:off x="2744656" y="4824473"/>
+                <a:ext cx="3910198" cy="369332"/>
+              </a:xfrm>
+              <a:prstGeom prst="rect">
+                <a:avLst/>
+              </a:prstGeom>
+              <a:noFill/>
+            </p:spPr>
+            <p:txBody>
+              <a:bodyPr wrap="square" rtlCol="0">
+                <a:spAutoFit/>
+              </a:bodyPr>
+              <a:lstStyle/>
+              <a:p>
+                <a:r>
+                  <a:rPr lang="en-US" dirty="0"/>
+                  <a:t>Big screens with real time dashboards</a:t>
+                </a:r>
+              </a:p>
+            </p:txBody>
+          </p:sp>
+          <p:cxnSp>
+            <p:nvCxnSpPr>
+              <p:cNvPr id="84" name="Straight Arrow Connector 83"/>
+              <p:cNvCxnSpPr/>
+              <p:nvPr/>
+            </p:nvCxnSpPr>
+            <p:spPr>
+              <a:xfrm flipH="1">
+                <a:off x="450419" y="3708453"/>
+                <a:ext cx="2597" cy="2212157"/>
+              </a:xfrm>
+              <a:prstGeom prst="straightConnector1">
+                <a:avLst/>
+              </a:prstGeom>
+              <a:ln w="38100">
+                <a:solidFill>
+                  <a:schemeClr val="accent6">
+                    <a:lumMod val="75000"/>
+                  </a:schemeClr>
+                </a:solidFill>
+                <a:headEnd type="none"/>
+                <a:tailEnd type="triangle"/>
+              </a:ln>
+            </p:spPr>
+            <p:style>
+              <a:lnRef idx="1">
+                <a:schemeClr val="accent1"/>
+              </a:lnRef>
+              <a:fillRef idx="0">
+                <a:schemeClr val="accent1"/>
+              </a:fillRef>
+              <a:effectRef idx="0">
+                <a:schemeClr val="accent1"/>
+              </a:effectRef>
+              <a:fontRef idx="minor">
+                <a:schemeClr val="tx1"/>
+              </a:fontRef>
+            </p:style>
+          </p:cxnSp>
+          <p:sp>
+            <p:nvSpPr>
+              <p:cNvPr id="86" name="TextBox 85"/>
+              <p:cNvSpPr txBox="1"/>
+              <p:nvPr/>
+            </p:nvSpPr>
+            <p:spPr>
+              <a:xfrm>
+                <a:off x="589235" y="3876793"/>
+                <a:ext cx="1641299" cy="1015663"/>
+              </a:xfrm>
+              <a:prstGeom prst="rect">
+                <a:avLst/>
+              </a:prstGeom>
+              <a:noFill/>
+            </p:spPr>
+            <p:txBody>
+              <a:bodyPr wrap="square" rtlCol="0">
+                <a:spAutoFit/>
+              </a:bodyPr>
+              <a:lstStyle/>
+              <a:p>
+                <a:r>
+                  <a:rPr lang="en-US" sz="2000" b="1" dirty="0">
+                    <a:solidFill>
+                      <a:srgbClr val="7030A0"/>
+                    </a:solidFill>
+                  </a:rPr>
+                  <a:t>Post-visit feedback: Chat with bot</a:t>
+                </a:r>
+              </a:p>
+            </p:txBody>
+          </p:sp>
+          <p:pic>
+            <p:nvPicPr>
+              <p:cNvPr id="1045" name="Picture 1044"/>
+              <p:cNvPicPr>
+                <a:picLocks noChangeAspect="1"/>
+              </p:cNvPicPr>
+              <p:nvPr/>
+            </p:nvPicPr>
+            <p:blipFill>
+              <a:blip r:embed="rId15"/>
+              <a:stretch>
+                <a:fillRect/>
+              </a:stretch>
+            </p:blipFill>
+            <p:spPr>
+              <a:xfrm>
+                <a:off x="682075" y="5150395"/>
+                <a:ext cx="1007274" cy="1012071"/>
+              </a:xfrm>
+              <a:prstGeom prst="rect">
+                <a:avLst/>
+              </a:prstGeom>
+            </p:spPr>
+          </p:pic>
+          <p:cxnSp>
+            <p:nvCxnSpPr>
+              <p:cNvPr id="97" name="Straight Arrow Connector 96"/>
+              <p:cNvCxnSpPr/>
+              <p:nvPr/>
+            </p:nvCxnSpPr>
+            <p:spPr>
+              <a:xfrm>
+                <a:off x="604417" y="6420406"/>
+                <a:ext cx="7953113" cy="29582"/>
+              </a:xfrm>
+              <a:prstGeom prst="straightConnector1">
+                <a:avLst/>
+              </a:prstGeom>
+              <a:ln w="38100">
+                <a:solidFill>
+                  <a:schemeClr val="accent6">
+                    <a:lumMod val="75000"/>
+                  </a:schemeClr>
+                </a:solidFill>
+                <a:headEnd type="triangle"/>
+                <a:tailEnd type="triangle"/>
+              </a:ln>
+            </p:spPr>
+            <p:style>
+              <a:lnRef idx="1">
+                <a:schemeClr val="accent1"/>
+              </a:lnRef>
+              <a:fillRef idx="0">
+                <a:schemeClr val="accent1"/>
+              </a:fillRef>
+              <a:effectRef idx="0">
+                <a:schemeClr val="accent1"/>
+              </a:effectRef>
+              <a:fontRef idx="minor">
+                <a:schemeClr val="tx1"/>
+              </a:fontRef>
+            </p:style>
+          </p:cxnSp>
+          <p:sp>
+            <p:nvSpPr>
+              <p:cNvPr id="104" name="TextBox 103"/>
+              <p:cNvSpPr txBox="1"/>
+              <p:nvPr/>
+            </p:nvSpPr>
+            <p:spPr>
+              <a:xfrm>
+                <a:off x="6939051" y="1910390"/>
+                <a:ext cx="2507418" cy="646331"/>
+              </a:xfrm>
+              <a:prstGeom prst="rect">
+                <a:avLst/>
+              </a:prstGeom>
+              <a:noFill/>
+            </p:spPr>
+            <p:txBody>
+              <a:bodyPr wrap="none" rtlCol="0">
+                <a:spAutoFit/>
+              </a:bodyPr>
+              <a:lstStyle/>
+              <a:p>
+                <a:r>
+                  <a:rPr lang="en-US" dirty="0"/>
+                  <a:t>Real time sensor data</a:t>
+                </a:r>
+              </a:p>
+              <a:p>
+                <a:r>
+                  <a:rPr lang="en-US" dirty="0"/>
+                  <a:t>Real time questionnaires</a:t>
+                </a:r>
+              </a:p>
+            </p:txBody>
+          </p:sp>
+        </p:grpSp>
+        <p:pic>
+          <p:nvPicPr>
+            <p:cNvPr id="1026" name="Picture 2" descr="https://azure.microsoft.com/svghandler/iot-hub?width=600&amp;height=315"/>
+            <p:cNvPicPr>
+              <a:picLocks noChangeAspect="1" noChangeArrowheads="1"/>
+            </p:cNvPicPr>
+            <p:nvPr/>
+          </p:nvPicPr>
+          <p:blipFill>
+            <a:blip r:embed="rId16">
+              <a:extLst>
+                <a:ext uri="{28A0092B-C50C-407E-A947-70E740481C1C}">
+                  <a14:useLocalDpi xmlns:a14="http://schemas.microsoft.com/office/drawing/2010/main" val="0"/>
+                </a:ext>
+              </a:extLst>
+            </a:blip>
+            <a:srcRect/>
+            <a:stretch>
+              <a:fillRect/>
+            </a:stretch>
+          </p:blipFill>
+          <p:spPr bwMode="auto">
+            <a:xfrm>
+              <a:off x="9483616" y="1369059"/>
+              <a:ext cx="2253381" cy="1183025"/>
+            </a:xfrm>
+            <a:prstGeom prst="rect">
+              <a:avLst/>
+            </a:prstGeom>
+            <a:noFill/>
             <a:extLst>
-              <a:ext uri="{28A0092B-C50C-407E-A947-70E740481C1C}">
-                <a14:useLocalDpi xmlns:a14="http://schemas.microsoft.com/office/drawing/2010/main" val="0"/>
+              <a:ext uri="{909E8E84-426E-40DD-AFC4-6F175D3DCCD1}">
+                <a14:hiddenFill xmlns:a14="http://schemas.microsoft.com/office/drawing/2010/main">
+                  <a:solidFill>
+                    <a:srgbClr val="FFFFFF"/>
+                  </a:solidFill>
+                </a14:hiddenFill>
               </a:ext>
             </a:extLst>
-          </a:blip>
-          <a:stretch>
-            <a:fillRect/>
-          </a:stretch>
-        </p:blipFill>
-        <p:spPr>
-          <a:xfrm>
-            <a:off x="4727250" y="5410322"/>
-            <a:ext cx="1518120" cy="717549"/>
-          </a:xfrm>
-          <a:prstGeom prst="rect">
-            <a:avLst/>
-          </a:prstGeom>
-          <a:solidFill>
-            <a:srgbClr val="FFFFFF">
-              <a:shade val="85000"/>
-            </a:srgbClr>
-          </a:solidFill>
-          <a:ln w="88900" cap="sq">
-            <a:solidFill>
-              <a:srgbClr val="FFFFFF"/>
-            </a:solidFill>
-            <a:miter lim="800000"/>
-          </a:ln>
-          <a:effectLst>
-            <a:outerShdw blurRad="55000" dist="18000" dir="5400000" algn="tl" rotWithShape="0">
-              <a:srgbClr val="000000">
-                <a:alpha val="40000"/>
-              </a:srgbClr>
-            </a:outerShdw>
-          </a:effectLst>
-          <a:scene3d>
-            <a:camera prst="orthographicFront"/>
-            <a:lightRig rig="twoPt" dir="t">
-              <a:rot lat="0" lon="0" rev="7200000"/>
-            </a:lightRig>
-          </a:scene3d>
-          <a:sp3d>
-            <a:bevelT w="25400" h="19050"/>
-            <a:contourClr>
-              <a:srgbClr val="FFFFFF"/>
-            </a:contourClr>
-          </a:sp3d>
-        </p:spPr>
-      </p:pic>
-      <p:sp>
-        <p:nvSpPr>
-          <p:cNvPr id="82" name="TextBox 81"/>
-          <p:cNvSpPr txBox="1"/>
-          <p:nvPr/>
-        </p:nvSpPr>
-        <p:spPr>
-          <a:xfrm>
-            <a:off x="2451155" y="5486340"/>
-            <a:ext cx="2185340" cy="707886"/>
-          </a:xfrm>
-          <a:prstGeom prst="rect">
-            <a:avLst/>
-          </a:prstGeom>
-          <a:noFill/>
-        </p:spPr>
-        <p:txBody>
-          <a:bodyPr wrap="square" rtlCol="0">
-            <a:spAutoFit/>
-          </a:bodyPr>
-          <a:lstStyle/>
-          <a:p>
-            <a:pPr algn="r"/>
-            <a:r>
-              <a:rPr lang="en-US" sz="2000" b="1" dirty="0">
-                <a:solidFill>
-                  <a:srgbClr val="7030A0"/>
-                </a:solidFill>
-              </a:rPr>
-              <a:t>Post event BI for internal marketers</a:t>
-            </a:r>
-          </a:p>
-        </p:txBody>
-      </p:sp>
-      <p:sp>
-        <p:nvSpPr>
-          <p:cNvPr id="83" name="TextBox 82"/>
-          <p:cNvSpPr txBox="1"/>
-          <p:nvPr/>
-        </p:nvSpPr>
-        <p:spPr>
-          <a:xfrm>
-            <a:off x="2744656" y="4824473"/>
-            <a:ext cx="3910198" cy="369332"/>
-          </a:xfrm>
-          <a:prstGeom prst="rect">
-            <a:avLst/>
-          </a:prstGeom>
-          <a:noFill/>
-        </p:spPr>
-        <p:txBody>
-          <a:bodyPr wrap="square" rtlCol="0">
-            <a:spAutoFit/>
-          </a:bodyPr>
-          <a:lstStyle/>
-          <a:p>
-            <a:r>
-              <a:rPr lang="en-US" dirty="0"/>
-              <a:t>Big screens with real time dashboards</a:t>
-            </a:r>
-          </a:p>
-        </p:txBody>
-      </p:sp>
-      <p:cxnSp>
-        <p:nvCxnSpPr>
-          <p:cNvPr id="84" name="Straight Arrow Connector 83"/>
-          <p:cNvCxnSpPr/>
-          <p:nvPr/>
-        </p:nvCxnSpPr>
-        <p:spPr>
-          <a:xfrm flipH="1">
-            <a:off x="450419" y="3708453"/>
-            <a:ext cx="2597" cy="2212157"/>
-          </a:xfrm>
-          <a:prstGeom prst="straightConnector1">
-            <a:avLst/>
-          </a:prstGeom>
-          <a:ln w="38100">
-            <a:solidFill>
-              <a:schemeClr val="accent6">
-                <a:lumMod val="75000"/>
-              </a:schemeClr>
-            </a:solidFill>
-            <a:headEnd type="none"/>
-            <a:tailEnd type="triangle"/>
-          </a:ln>
-        </p:spPr>
-        <p:style>
-          <a:lnRef idx="1">
-            <a:schemeClr val="accent1"/>
-          </a:lnRef>
-          <a:fillRef idx="0">
-            <a:schemeClr val="accent1"/>
-          </a:fillRef>
-          <a:effectRef idx="0">
-            <a:schemeClr val="accent1"/>
-          </a:effectRef>
-          <a:fontRef idx="minor">
-            <a:schemeClr val="tx1"/>
-          </a:fontRef>
-        </p:style>
-      </p:cxnSp>
-      <p:sp>
-        <p:nvSpPr>
-          <p:cNvPr id="86" name="TextBox 85"/>
-          <p:cNvSpPr txBox="1"/>
-          <p:nvPr/>
-        </p:nvSpPr>
-        <p:spPr>
-          <a:xfrm>
-            <a:off x="589235" y="3876793"/>
-            <a:ext cx="1641299" cy="1015663"/>
-          </a:xfrm>
-          <a:prstGeom prst="rect">
-            <a:avLst/>
-          </a:prstGeom>
-          <a:noFill/>
-        </p:spPr>
-        <p:txBody>
-          <a:bodyPr wrap="square" rtlCol="0">
-            <a:spAutoFit/>
-          </a:bodyPr>
-          <a:lstStyle/>
-          <a:p>
-            <a:r>
-              <a:rPr lang="en-US" sz="2000" b="1" dirty="0">
-                <a:solidFill>
-                  <a:srgbClr val="7030A0"/>
-                </a:solidFill>
-              </a:rPr>
-              <a:t>Post-visit feedback: Chat with bot</a:t>
-            </a:r>
-          </a:p>
-        </p:txBody>
-      </p:sp>
-      <p:pic>
-        <p:nvPicPr>
-          <p:cNvPr id="1045" name="Picture 1044"/>
-          <p:cNvPicPr>
-            <a:picLocks noChangeAspect="1"/>
-          </p:cNvPicPr>
-          <p:nvPr/>
-        </p:nvPicPr>
-        <p:blipFill>
-          <a:blip r:embed="rId16"/>
-          <a:stretch>
-            <a:fillRect/>
-          </a:stretch>
-        </p:blipFill>
-        <p:spPr>
-          <a:xfrm>
-            <a:off x="682075" y="5150395"/>
-            <a:ext cx="1007274" cy="1012071"/>
-          </a:xfrm>
-          <a:prstGeom prst="rect">
-            <a:avLst/>
-          </a:prstGeom>
-        </p:spPr>
-      </p:pic>
-      <p:cxnSp>
-        <p:nvCxnSpPr>
-          <p:cNvPr id="97" name="Straight Arrow Connector 96"/>
-          <p:cNvCxnSpPr/>
-          <p:nvPr/>
-        </p:nvCxnSpPr>
-        <p:spPr>
-          <a:xfrm>
-            <a:off x="604417" y="6420406"/>
-            <a:ext cx="7953113" cy="29582"/>
-          </a:xfrm>
-          <a:prstGeom prst="straightConnector1">
-            <a:avLst/>
-          </a:prstGeom>
-          <a:ln w="38100">
-            <a:solidFill>
-              <a:schemeClr val="accent6">
-                <a:lumMod val="75000"/>
-              </a:schemeClr>
-            </a:solidFill>
-            <a:headEnd type="triangle"/>
-            <a:tailEnd type="triangle"/>
-          </a:ln>
-        </p:spPr>
-        <p:style>
-          <a:lnRef idx="1">
-            <a:schemeClr val="accent1"/>
-          </a:lnRef>
-          <a:fillRef idx="0">
-            <a:schemeClr val="accent1"/>
-          </a:fillRef>
-          <a:effectRef idx="0">
-            <a:schemeClr val="accent1"/>
-          </a:effectRef>
-          <a:fontRef idx="minor">
-            <a:schemeClr val="tx1"/>
-          </a:fontRef>
-        </p:style>
-      </p:cxnSp>
-      <p:sp>
-        <p:nvSpPr>
-          <p:cNvPr id="104" name="TextBox 103"/>
-          <p:cNvSpPr txBox="1"/>
-          <p:nvPr/>
-        </p:nvSpPr>
-        <p:spPr>
-          <a:xfrm>
-            <a:off x="6939051" y="1910390"/>
-            <a:ext cx="2507418" cy="646331"/>
-          </a:xfrm>
-          <a:prstGeom prst="rect">
-            <a:avLst/>
-          </a:prstGeom>
-          <a:noFill/>
-        </p:spPr>
-        <p:txBody>
-          <a:bodyPr wrap="none" rtlCol="0">
-            <a:spAutoFit/>
-          </a:bodyPr>
-          <a:lstStyle/>
-          <a:p>
-            <a:r>
-              <a:rPr lang="en-US" dirty="0"/>
-              <a:t>Real time sensor data</a:t>
-            </a:r>
-          </a:p>
-          <a:p>
-            <a:r>
-              <a:rPr lang="en-US" dirty="0"/>
-              <a:t>Real time questionnaires</a:t>
-            </a:r>
-          </a:p>
-        </p:txBody>
-      </p:sp>
+          </p:spPr>
+        </p:pic>
+      </p:grpSp>
     </p:spTree>
     <p:extLst>
       <p:ext uri="{BB962C8B-B14F-4D97-AF65-F5344CB8AC3E}">
-        <p14:creationId xmlns:p14="http://schemas.microsoft.com/office/powerpoint/2010/main" val="2528420053"/>
+        <p14:creationId xmlns:p14="http://schemas.microsoft.com/office/powerpoint/2010/main" val="2061646073"/>
       </p:ext>
     </p:extLst>
   </p:cSld>
@@ -4675,7 +4737,55 @@
 </Control>
 </file>
 
+<file path=customXml/item5.xml><?xml version="1.0" encoding="utf-8"?>
+<Control xmlns="http://schemas.microsoft.com/VisualStudio/2011/storyboarding/control">
+  <Id Name="System.Storyboarding.Icons.User" Revision="1" Stencil="System.Storyboarding.Icons" StencilVersion="0.1"/>
+</Control>
+</file>
+
+<file path=customXml/item6.xml><?xml version="1.0" encoding="utf-8"?>
+<Control xmlns="http://schemas.microsoft.com/VisualStudio/2011/storyboarding/control">
+  <Id Name="System.Storyboarding.Icons.User" Revision="1" Stencil="System.Storyboarding.Icons" StencilVersion="0.1"/>
+</Control>
+</file>
+
+<file path=customXml/item7.xml><?xml version="1.0" encoding="utf-8"?>
+<Control xmlns="http://schemas.microsoft.com/VisualStudio/2011/storyboarding/control">
+  <Id Name="System.Storyboarding.Icons.User" Revision="1" Stencil="System.Storyboarding.Icons" StencilVersion="0.1"/>
+</Control>
+</file>
+
+<file path=customXml/item8.xml><?xml version="1.0" encoding="utf-8"?>
+<Control xmlns="http://schemas.microsoft.com/VisualStudio/2011/storyboarding/control">
+  <Id Name="System.Storyboarding.Icons.User" Revision="1" Stencil="System.Storyboarding.Icons" StencilVersion="0.1"/>
+</Control>
+</file>
+
 <file path=customXml/itemProps1.xml><?xml version="1.0" encoding="utf-8"?>
+<ds:datastoreItem xmlns:ds="http://schemas.openxmlformats.org/officeDocument/2006/customXml" ds:itemID="{1F061032-FDE2-4AAF-9397-A9CD4375AAE6}">
+  <ds:schemaRefs>
+    <ds:schemaRef ds:uri="http://schemas.microsoft.com/VisualStudio/2011/storyboarding/control"/>
+  </ds:schemaRefs>
+</ds:datastoreItem>
+</file>
+
+<file path=customXml/itemProps2.xml><?xml version="1.0" encoding="utf-8"?>
+<ds:datastoreItem xmlns:ds="http://schemas.openxmlformats.org/officeDocument/2006/customXml" ds:itemID="{D2F1BA3C-906F-464E-81A7-984EEEA63857}">
+  <ds:schemaRefs>
+    <ds:schemaRef ds:uri="http://schemas.microsoft.com/VisualStudio/2011/storyboarding/control"/>
+  </ds:schemaRefs>
+</ds:datastoreItem>
+</file>
+
+<file path=customXml/itemProps3.xml><?xml version="1.0" encoding="utf-8"?>
+<ds:datastoreItem xmlns:ds="http://schemas.openxmlformats.org/officeDocument/2006/customXml" ds:itemID="{78EE54C1-5480-45BB-AD3E-0474A7E117EA}">
+  <ds:schemaRefs>
+    <ds:schemaRef ds:uri="http://schemas.microsoft.com/VisualStudio/2011/storyboarding/control"/>
+  </ds:schemaRefs>
+</ds:datastoreItem>
+</file>
+
+<file path=customXml/itemProps4.xml><?xml version="1.0" encoding="utf-8"?>
 <ds:datastoreItem xmlns:ds="http://schemas.openxmlformats.org/officeDocument/2006/customXml" ds:itemID="{C13F3875-43C2-497C-8943-65416C5EF68D}">
   <ds:schemaRefs>
     <ds:schemaRef ds:uri="http://schemas.microsoft.com/VisualStudio/2011/storyboarding/control"/>
@@ -4683,24 +4793,32 @@
 </ds:datastoreItem>
 </file>
 
-<file path=customXml/itemProps2.xml><?xml version="1.0" encoding="utf-8"?>
-<ds:datastoreItem xmlns:ds="http://schemas.openxmlformats.org/officeDocument/2006/customXml" ds:itemID="{78EE54C1-5480-45BB-AD3E-0474A7E117EA}">
+<file path=customXml/itemProps5.xml><?xml version="1.0" encoding="utf-8"?>
+<ds:datastoreItem xmlns:ds="http://schemas.openxmlformats.org/officeDocument/2006/customXml" ds:itemID="{5320F610-24E0-4BE8-BD48-0844CC17C132}">
   <ds:schemaRefs>
     <ds:schemaRef ds:uri="http://schemas.microsoft.com/VisualStudio/2011/storyboarding/control"/>
   </ds:schemaRefs>
 </ds:datastoreItem>
 </file>
 
-<file path=customXml/itemProps3.xml><?xml version="1.0" encoding="utf-8"?>
-<ds:datastoreItem xmlns:ds="http://schemas.openxmlformats.org/officeDocument/2006/customXml" ds:itemID="{D2F1BA3C-906F-464E-81A7-984EEEA63857}">
+<file path=customXml/itemProps6.xml><?xml version="1.0" encoding="utf-8"?>
+<ds:datastoreItem xmlns:ds="http://schemas.openxmlformats.org/officeDocument/2006/customXml" ds:itemID="{98FE8B6A-5661-4CFD-B660-01EE569D0A1C}">
   <ds:schemaRefs>
     <ds:schemaRef ds:uri="http://schemas.microsoft.com/VisualStudio/2011/storyboarding/control"/>
   </ds:schemaRefs>
 </ds:datastoreItem>
 </file>
 
-<file path=customXml/itemProps4.xml><?xml version="1.0" encoding="utf-8"?>
-<ds:datastoreItem xmlns:ds="http://schemas.openxmlformats.org/officeDocument/2006/customXml" ds:itemID="{1F061032-FDE2-4AAF-9397-A9CD4375AAE6}">
+<file path=customXml/itemProps7.xml><?xml version="1.0" encoding="utf-8"?>
+<ds:datastoreItem xmlns:ds="http://schemas.openxmlformats.org/officeDocument/2006/customXml" ds:itemID="{9FBDA9D4-9A9D-41A4-9A31-5FF343182502}">
+  <ds:schemaRefs>
+    <ds:schemaRef ds:uri="http://schemas.microsoft.com/VisualStudio/2011/storyboarding/control"/>
+  </ds:schemaRefs>
+</ds:datastoreItem>
+</file>
+
+<file path=customXml/itemProps8.xml><?xml version="1.0" encoding="utf-8"?>
+<ds:datastoreItem xmlns:ds="http://schemas.openxmlformats.org/officeDocument/2006/customXml" ds:itemID="{0EB0839D-5ABE-458E-A74E-5C62B122DBBD}">
   <ds:schemaRefs>
     <ds:schemaRef ds:uri="http://schemas.microsoft.com/VisualStudio/2011/storyboarding/control"/>
   </ds:schemaRefs>

</xml_diff>